<commit_message>
added one slide (47) and fixed typos
</commit_message>
<xml_diff>
--- a/06- Neural Networks/ML4NuerScience_NeuralNets.pptx
+++ b/06- Neural Networks/ML4NuerScience_NeuralNets.pptx
@@ -5,10 +5,10 @@
     <p:sldMasterId id="2147483685" r:id="rId1"/>
   </p:sldMasterIdLst>
   <p:notesMasterIdLst>
-    <p:notesMasterId r:id="rId61"/>
+    <p:notesMasterId r:id="rId63"/>
   </p:notesMasterIdLst>
   <p:handoutMasterIdLst>
-    <p:handoutMasterId r:id="rId62"/>
+    <p:handoutMasterId r:id="rId64"/>
   </p:handoutMasterIdLst>
   <p:sldIdLst>
     <p:sldId id="297" r:id="rId2"/>
@@ -57,19 +57,21 @@
     <p:sldId id="1310" r:id="rId45"/>
     <p:sldId id="1311" r:id="rId46"/>
     <p:sldId id="1312" r:id="rId47"/>
-    <p:sldId id="1313" r:id="rId48"/>
-    <p:sldId id="1319" r:id="rId49"/>
-    <p:sldId id="756" r:id="rId50"/>
-    <p:sldId id="755" r:id="rId51"/>
-    <p:sldId id="1314" r:id="rId52"/>
-    <p:sldId id="1315" r:id="rId53"/>
-    <p:sldId id="1294" r:id="rId54"/>
-    <p:sldId id="1317" r:id="rId55"/>
-    <p:sldId id="1318" r:id="rId56"/>
-    <p:sldId id="1229" r:id="rId57"/>
-    <p:sldId id="1149" r:id="rId58"/>
-    <p:sldId id="1274" r:id="rId59"/>
-    <p:sldId id="1291" r:id="rId60"/>
+    <p:sldId id="1321" r:id="rId48"/>
+    <p:sldId id="1313" r:id="rId49"/>
+    <p:sldId id="1319" r:id="rId50"/>
+    <p:sldId id="756" r:id="rId51"/>
+    <p:sldId id="755" r:id="rId52"/>
+    <p:sldId id="1314" r:id="rId53"/>
+    <p:sldId id="1315" r:id="rId54"/>
+    <p:sldId id="1294" r:id="rId55"/>
+    <p:sldId id="1317" r:id="rId56"/>
+    <p:sldId id="1318" r:id="rId57"/>
+    <p:sldId id="1229" r:id="rId58"/>
+    <p:sldId id="1149" r:id="rId59"/>
+    <p:sldId id="1274" r:id="rId60"/>
+    <p:sldId id="1291" r:id="rId61"/>
+    <p:sldId id="1320" r:id="rId62"/>
   </p:sldIdLst>
   <p:sldSz cx="9144000" cy="5715000" type="screen16x10"/>
   <p:notesSz cx="7099300" cy="10234613"/>
@@ -357,7 +359,7 @@
               <a:pPr>
                 <a:defRPr/>
               </a:pPr>
-              <a:t>20/12/2022</a:t>
+              <a:t>21/01/2023</a:t>
             </a:fld>
             <a:endParaRPr lang="en-GB" altLang="en-US" dirty="0"/>
           </a:p>
@@ -591,7 +593,7 @@
               <a:pPr>
                 <a:defRPr/>
               </a:pPr>
-              <a:t>20/12/2022</a:t>
+              <a:t>21/01/2023</a:t>
             </a:fld>
             <a:endParaRPr lang="en-GB" altLang="en-US" dirty="0"/>
           </a:p>
@@ -1943,7 +1945,7 @@
               <a:pPr>
                 <a:defRPr/>
               </a:pPr>
-              <a:t>20/12/2022</a:t>
+              <a:t>21/01/2023</a:t>
             </a:fld>
             <a:endParaRPr lang="en-GB" altLang="en-US" dirty="0"/>
           </a:p>
@@ -2206,7 +2208,7 @@
               <a:pPr>
                 <a:defRPr/>
               </a:pPr>
-              <a:t>20/12/2022</a:t>
+              <a:t>21/01/2023</a:t>
             </a:fld>
             <a:endParaRPr lang="en-GB" altLang="en-US" dirty="0"/>
           </a:p>
@@ -2444,7 +2446,7 @@
               <a:pPr>
                 <a:defRPr/>
               </a:pPr>
-              <a:t>20/12/2022</a:t>
+              <a:t>21/01/2023</a:t>
             </a:fld>
             <a:endParaRPr lang="en-GB" altLang="en-US" dirty="0"/>
           </a:p>
@@ -2778,7 +2780,7 @@
               <a:pPr>
                 <a:defRPr/>
               </a:pPr>
-              <a:t>20/12/2022</a:t>
+              <a:t>21/01/2023</a:t>
             </a:fld>
             <a:endParaRPr lang="en-GB" altLang="en-US" dirty="0"/>
           </a:p>
@@ -3251,7 +3253,7 @@
               <a:pPr>
                 <a:defRPr/>
               </a:pPr>
-              <a:t>20/12/2022</a:t>
+              <a:t>21/01/2023</a:t>
             </a:fld>
             <a:endParaRPr lang="en-GB" altLang="en-US" dirty="0"/>
           </a:p>
@@ -3415,7 +3417,7 @@
               <a:pPr>
                 <a:defRPr/>
               </a:pPr>
-              <a:t>20/12/2022</a:t>
+              <a:t>21/01/2023</a:t>
             </a:fld>
             <a:endParaRPr lang="en-GB" altLang="en-US" dirty="0"/>
           </a:p>
@@ -3556,7 +3558,7 @@
               <a:pPr>
                 <a:defRPr/>
               </a:pPr>
-              <a:t>20/12/2022</a:t>
+              <a:t>21/01/2023</a:t>
             </a:fld>
             <a:endParaRPr lang="en-GB" altLang="en-US" dirty="0"/>
           </a:p>
@@ -3856,7 +3858,7 @@
               <a:pPr>
                 <a:defRPr/>
               </a:pPr>
-              <a:t>20/12/2022</a:t>
+              <a:t>21/01/2023</a:t>
             </a:fld>
             <a:endParaRPr lang="en-GB" altLang="en-US" dirty="0"/>
           </a:p>
@@ -4182,7 +4184,7 @@
               <a:pPr>
                 <a:defRPr/>
               </a:pPr>
-              <a:t>20/12/2022</a:t>
+              <a:t>21/01/2023</a:t>
             </a:fld>
             <a:endParaRPr lang="en-GB" altLang="en-US" dirty="0"/>
           </a:p>
@@ -5227,7 +5229,7 @@
                   <a:srgbClr val="003D7D"/>
                 </a:solidFill>
               </a:rPr>
-              <a:t>Bayesian models</a:t>
+              <a:t>Neural Networks</a:t>
             </a:r>
           </a:p>
           <a:p>
@@ -11877,7 +11879,7 @@
         </p:blipFill>
         <p:spPr>
           <a:xfrm>
-            <a:off x="2411760" y="3096192"/>
+            <a:off x="2411760" y="2857500"/>
             <a:ext cx="3594100" cy="1092200"/>
           </a:xfrm>
           <a:prstGeom prst="rect">
@@ -14706,7 +14708,82 @@
                         <a:rPr lang="en-GB" sz="1400" b="0" i="0" smtClean="0">
                           <a:latin typeface="Cambria Math" panose="02040503050406030204" pitchFamily="18" charset="0"/>
                         </a:rPr>
-                        <m:t>=0.34 </m:t>
+                        <m:t>=</m:t>
+                      </m:r>
+                      <m:r>
+                        <a:rPr lang="en-GB" sz="1400" i="1">
+                          <a:latin typeface="Cambria Math" panose="02040503050406030204" pitchFamily="18" charset="0"/>
+                        </a:rPr>
+                        <m:t>h</m:t>
+                      </m:r>
+                      <m:r>
+                        <a:rPr lang="en-GB" sz="1400" b="0" i="1" smtClean="0">
+                          <a:latin typeface="Cambria Math" panose="02040503050406030204" pitchFamily="18" charset="0"/>
+                        </a:rPr>
+                        <m:t> </m:t>
+                      </m:r>
+                      <m:r>
+                        <a:rPr lang="en-GB" sz="1400" b="0" i="1" smtClean="0">
+                          <a:latin typeface="Cambria Math" panose="02040503050406030204" pitchFamily="18" charset="0"/>
+                          <a:ea typeface="Cambria Math" panose="02040503050406030204" pitchFamily="18" charset="0"/>
+                        </a:rPr>
+                        <m:t>×</m:t>
+                      </m:r>
+                      <m:r>
+                        <a:rPr lang="en-GB" sz="1400" i="1">
+                          <a:latin typeface="Cambria Math" panose="02040503050406030204" pitchFamily="18" charset="0"/>
+                        </a:rPr>
+                        <m:t>𝑔𝑟𝑎</m:t>
+                      </m:r>
+                      <m:sSub>
+                        <m:sSubPr>
+                          <m:ctrlPr>
+                            <a:rPr lang="en-GB" sz="1400" i="1">
+                              <a:latin typeface="Cambria Math" panose="02040503050406030204" pitchFamily="18" charset="0"/>
+                            </a:rPr>
+                          </m:ctrlPr>
+                        </m:sSubPr>
+                        <m:e>
+                          <m:r>
+                            <a:rPr lang="en-GB" sz="1400" i="1">
+                              <a:latin typeface="Cambria Math" panose="02040503050406030204" pitchFamily="18" charset="0"/>
+                            </a:rPr>
+                            <m:t>𝑑</m:t>
+                          </m:r>
+                        </m:e>
+                        <m:sub>
+                          <m:sSub>
+                            <m:sSubPr>
+                              <m:ctrlPr>
+                                <a:rPr lang="en-GB" sz="1400" i="1">
+                                  <a:latin typeface="Cambria Math" panose="02040503050406030204" pitchFamily="18" charset="0"/>
+                                </a:rPr>
+                              </m:ctrlPr>
+                            </m:sSubPr>
+                            <m:e>
+                              <m:r>
+                                <a:rPr lang="en-GB" sz="1400" i="1">
+                                  <a:latin typeface="Cambria Math" panose="02040503050406030204" pitchFamily="18" charset="0"/>
+                                </a:rPr>
+                                <m:t>𝑦</m:t>
+                              </m:r>
+                            </m:e>
+                            <m:sub>
+                              <m:r>
+                                <a:rPr lang="en-GB" sz="1400" i="1">
+                                  <a:latin typeface="Cambria Math" panose="02040503050406030204" pitchFamily="18" charset="0"/>
+                                </a:rPr>
+                                <m:t>𝑝𝑟𝑒𝑑</m:t>
+                              </m:r>
+                            </m:sub>
+                          </m:sSub>
+                        </m:sub>
+                      </m:sSub>
+                      <m:r>
+                        <a:rPr lang="en-GB" sz="1400" b="0" i="0" smtClean="0">
+                          <a:latin typeface="Cambria Math" panose="02040503050406030204" pitchFamily="18" charset="0"/>
+                        </a:rPr>
+                        <m:t>= 0.34 </m:t>
                       </m:r>
                       <m:r>
                         <a:rPr lang="en-GB" sz="1400" b="0" i="1" smtClean="0">
@@ -17011,7 +17088,82 @@
                         <a:rPr lang="en-GB" sz="1200" b="0" i="0" smtClean="0">
                           <a:latin typeface="Cambria Math" panose="02040503050406030204" pitchFamily="18" charset="0"/>
                         </a:rPr>
-                        <m:t>=0.34 </m:t>
+                        <m:t>=</m:t>
+                      </m:r>
+                      <m:r>
+                        <a:rPr lang="en-GB" sz="1200" i="1">
+                          <a:latin typeface="Cambria Math" panose="02040503050406030204" pitchFamily="18" charset="0"/>
+                        </a:rPr>
+                        <m:t>h</m:t>
+                      </m:r>
+                      <m:r>
+                        <a:rPr lang="en-GB" sz="1200" b="0" i="0" smtClean="0">
+                          <a:latin typeface="Cambria Math" panose="02040503050406030204" pitchFamily="18" charset="0"/>
+                        </a:rPr>
+                        <m:t> </m:t>
+                      </m:r>
+                      <m:r>
+                        <a:rPr lang="en-GB" sz="1200" b="0" i="1" smtClean="0">
+                          <a:latin typeface="Cambria Math" panose="02040503050406030204" pitchFamily="18" charset="0"/>
+                          <a:ea typeface="Cambria Math" panose="02040503050406030204" pitchFamily="18" charset="0"/>
+                        </a:rPr>
+                        <m:t>×</m:t>
+                      </m:r>
+                      <m:r>
+                        <a:rPr lang="en-GB" sz="1200" i="1">
+                          <a:latin typeface="Cambria Math" panose="02040503050406030204" pitchFamily="18" charset="0"/>
+                        </a:rPr>
+                        <m:t>𝑔𝑟𝑎</m:t>
+                      </m:r>
+                      <m:sSub>
+                        <m:sSubPr>
+                          <m:ctrlPr>
+                            <a:rPr lang="en-GB" sz="1200" i="1">
+                              <a:latin typeface="Cambria Math" panose="02040503050406030204" pitchFamily="18" charset="0"/>
+                            </a:rPr>
+                          </m:ctrlPr>
+                        </m:sSubPr>
+                        <m:e>
+                          <m:r>
+                            <a:rPr lang="en-GB" sz="1200" i="1">
+                              <a:latin typeface="Cambria Math" panose="02040503050406030204" pitchFamily="18" charset="0"/>
+                            </a:rPr>
+                            <m:t>𝑑</m:t>
+                          </m:r>
+                        </m:e>
+                        <m:sub>
+                          <m:sSub>
+                            <m:sSubPr>
+                              <m:ctrlPr>
+                                <a:rPr lang="en-GB" sz="1200" i="1">
+                                  <a:latin typeface="Cambria Math" panose="02040503050406030204" pitchFamily="18" charset="0"/>
+                                </a:rPr>
+                              </m:ctrlPr>
+                            </m:sSubPr>
+                            <m:e>
+                              <m:r>
+                                <a:rPr lang="en-GB" sz="1200" i="1">
+                                  <a:latin typeface="Cambria Math" panose="02040503050406030204" pitchFamily="18" charset="0"/>
+                                </a:rPr>
+                                <m:t>𝑦</m:t>
+                              </m:r>
+                            </m:e>
+                            <m:sub>
+                              <m:r>
+                                <a:rPr lang="en-GB" sz="1200" i="1">
+                                  <a:latin typeface="Cambria Math" panose="02040503050406030204" pitchFamily="18" charset="0"/>
+                                </a:rPr>
+                                <m:t>𝑝𝑟𝑒𝑑</m:t>
+                              </m:r>
+                            </m:sub>
+                          </m:sSub>
+                        </m:sub>
+                      </m:sSub>
+                      <m:r>
+                        <a:rPr lang="en-GB" sz="1200" b="0" i="0" smtClean="0">
+                          <a:latin typeface="Cambria Math" panose="02040503050406030204" pitchFamily="18" charset="0"/>
+                        </a:rPr>
+                        <m:t>= 0.34 </m:t>
                       </m:r>
                       <m:r>
                         <a:rPr lang="en-GB" sz="1200" b="0" i="1" smtClean="0">
@@ -21047,8 +21199,8 @@
             </p:nvSpPr>
             <p:spPr>
               <a:xfrm>
-                <a:off x="729725" y="2577967"/>
-                <a:ext cx="4971169" cy="3054554"/>
+                <a:off x="513489" y="2548867"/>
+                <a:ext cx="4563109" cy="2741328"/>
               </a:xfrm>
               <a:prstGeom prst="rect">
                 <a:avLst/>
@@ -21069,13 +21221,13 @@
                     </m:oMathParaPr>
                     <m:oMath xmlns:m="http://schemas.openxmlformats.org/officeDocument/2006/math">
                       <m:r>
-                        <a:rPr lang="en-GB" sz="1200" i="1" smtClean="0">
+                        <a:rPr lang="en-GB" sz="1100" i="1">
                           <a:latin typeface="Cambria Math" panose="02040503050406030204" pitchFamily="18" charset="0"/>
                         </a:rPr>
                         <m:t>𝑧</m:t>
                       </m:r>
                       <m:r>
-                        <a:rPr lang="en-GB" sz="1200" b="0" i="1" smtClean="0">
+                        <a:rPr lang="en-GB" sz="1100" i="1">
                           <a:latin typeface="Cambria Math" panose="02040503050406030204" pitchFamily="18" charset="0"/>
                         </a:rPr>
                         <m:t>=</m:t>
@@ -21083,149 +21235,83 @@
                       <m:d>
                         <m:dPr>
                           <m:ctrlPr>
-                            <a:rPr lang="en-GB" sz="1200" b="0" i="1" smtClean="0">
+                            <a:rPr lang="en-GB" sz="1100" i="1">
                               <a:latin typeface="Cambria Math" panose="02040503050406030204" pitchFamily="18" charset="0"/>
                             </a:rPr>
                           </m:ctrlPr>
                         </m:dPr>
                         <m:e>
                           <m:r>
-                            <a:rPr lang="en-GB" sz="1200" b="0" i="1" smtClean="0">
-                              <a:solidFill>
-                                <a:srgbClr val="00B0F0"/>
-                              </a:solidFill>
+                            <a:rPr lang="en-GB" sz="1100" i="1">
                               <a:latin typeface="Cambria Math" panose="02040503050406030204" pitchFamily="18" charset="0"/>
                             </a:rPr>
-                            <m:t>1</m:t>
-                          </m:r>
-                          <m:r>
-                            <a:rPr lang="en-GB" sz="1200" b="0" i="1" smtClean="0">
-                              <a:latin typeface="Cambria Math" panose="02040503050406030204" pitchFamily="18" charset="0"/>
-                              <a:ea typeface="Cambria Math" panose="02040503050406030204" pitchFamily="18" charset="0"/>
-                            </a:rPr>
-                            <m:t>×</m:t>
-                          </m:r>
-                          <m:r>
-                            <a:rPr lang="en-GB" sz="1200" b="0" i="1" smtClean="0">
-                              <a:solidFill>
-                                <a:srgbClr val="FF0000"/>
-                              </a:solidFill>
-                              <a:latin typeface="Cambria Math" panose="02040503050406030204" pitchFamily="18" charset="0"/>
-                              <a:ea typeface="Cambria Math" panose="02040503050406030204" pitchFamily="18" charset="0"/>
-                            </a:rPr>
-                            <m:t>0.2</m:t>
+                            <m:t>1×0.2</m:t>
                           </m:r>
                         </m:e>
                       </m:d>
                       <m:r>
-                        <a:rPr lang="en-GB" sz="1200" b="0" i="1" smtClean="0">
+                        <a:rPr lang="en-GB" sz="1100" i="1">
                           <a:latin typeface="Cambria Math" panose="02040503050406030204" pitchFamily="18" charset="0"/>
-                          <a:ea typeface="Cambria Math" panose="02040503050406030204" pitchFamily="18" charset="0"/>
                         </a:rPr>
                         <m:t>+</m:t>
                       </m:r>
                       <m:d>
                         <m:dPr>
                           <m:ctrlPr>
-                            <a:rPr lang="en-GB" sz="1200" b="0" i="1" smtClean="0">
+                            <a:rPr lang="en-GB" sz="1100" i="1">
                               <a:latin typeface="Cambria Math" panose="02040503050406030204" pitchFamily="18" charset="0"/>
-                              <a:ea typeface="Cambria Math" panose="02040503050406030204" pitchFamily="18" charset="0"/>
                             </a:rPr>
                           </m:ctrlPr>
                         </m:dPr>
                         <m:e>
                           <m:r>
-                            <a:rPr lang="en-GB" sz="1200" b="0" i="1" smtClean="0">
-                              <a:solidFill>
-                                <a:srgbClr val="00B0F0"/>
-                              </a:solidFill>
+                            <a:rPr lang="en-GB" sz="1100" i="1">
                               <a:latin typeface="Cambria Math" panose="02040503050406030204" pitchFamily="18" charset="0"/>
-                              <a:ea typeface="Cambria Math" panose="02040503050406030204" pitchFamily="18" charset="0"/>
                             </a:rPr>
-                            <m:t>0.5</m:t>
-                          </m:r>
-                          <m:r>
-                            <a:rPr lang="en-GB" sz="1200" b="0" i="1" smtClean="0">
-                              <a:latin typeface="Cambria Math" panose="02040503050406030204" pitchFamily="18" charset="0"/>
-                              <a:ea typeface="Cambria Math" panose="02040503050406030204" pitchFamily="18" charset="0"/>
-                            </a:rPr>
-                            <m:t> × </m:t>
-                          </m:r>
-                          <m:r>
-                            <a:rPr lang="en-GB" sz="1200" b="0" i="1" smtClean="0">
-                              <a:solidFill>
-                                <a:srgbClr val="FF0000"/>
-                              </a:solidFill>
-                              <a:latin typeface="Cambria Math" panose="02040503050406030204" pitchFamily="18" charset="0"/>
-                              <a:ea typeface="Cambria Math" panose="02040503050406030204" pitchFamily="18" charset="0"/>
-                            </a:rPr>
-                            <m:t>0.1</m:t>
+                            <m:t>0.5 × 0.1</m:t>
                           </m:r>
                         </m:e>
                       </m:d>
                       <m:r>
-                        <a:rPr lang="en-GB" sz="1200" b="0" i="1" smtClean="0">
+                        <a:rPr lang="en-GB" sz="1100" i="1">
                           <a:latin typeface="Cambria Math" panose="02040503050406030204" pitchFamily="18" charset="0"/>
-                          <a:ea typeface="Cambria Math" panose="02040503050406030204" pitchFamily="18" charset="0"/>
                         </a:rPr>
                         <m:t>+</m:t>
                       </m:r>
                       <m:d>
                         <m:dPr>
                           <m:ctrlPr>
-                            <a:rPr lang="en-GB" sz="1200" b="0" i="1" smtClean="0">
-                              <a:solidFill>
-                                <a:srgbClr val="00B0F0"/>
-                              </a:solidFill>
+                            <a:rPr lang="en-GB" sz="1100" i="1">
                               <a:latin typeface="Cambria Math" panose="02040503050406030204" pitchFamily="18" charset="0"/>
-                              <a:ea typeface="Cambria Math" panose="02040503050406030204" pitchFamily="18" charset="0"/>
                             </a:rPr>
                           </m:ctrlPr>
                         </m:dPr>
                         <m:e>
                           <m:r>
-                            <a:rPr lang="en-GB" sz="1200" b="0" i="1" smtClean="0">
-                              <a:solidFill>
-                                <a:srgbClr val="00B0F0"/>
-                              </a:solidFill>
+                            <a:rPr lang="en-GB" sz="1100" i="1">
                               <a:latin typeface="Cambria Math" panose="02040503050406030204" pitchFamily="18" charset="0"/>
-                              <a:ea typeface="Cambria Math" panose="02040503050406030204" pitchFamily="18" charset="0"/>
                             </a:rPr>
-                            <m:t>0.3</m:t>
-                          </m:r>
-                          <m:r>
-                            <a:rPr lang="en-GB" sz="1200" b="0" i="1" smtClean="0">
-                              <a:latin typeface="Cambria Math" panose="02040503050406030204" pitchFamily="18" charset="0"/>
-                              <a:ea typeface="Cambria Math" panose="02040503050406030204" pitchFamily="18" charset="0"/>
-                            </a:rPr>
-                            <m:t> × </m:t>
-                          </m:r>
-                          <m:r>
-                            <a:rPr lang="en-GB" sz="1200" b="0" i="1" smtClean="0">
-                              <a:solidFill>
-                                <a:srgbClr val="FF0000"/>
-                              </a:solidFill>
-                              <a:latin typeface="Cambria Math" panose="02040503050406030204" pitchFamily="18" charset="0"/>
-                              <a:ea typeface="Cambria Math" panose="02040503050406030204" pitchFamily="18" charset="0"/>
-                            </a:rPr>
-                            <m:t>0.3</m:t>
+                            <m:t>0.3 × 0.3</m:t>
                           </m:r>
                         </m:e>
                       </m:d>
                       <m:r>
-                        <a:rPr lang="en-GB" sz="1200" b="0" i="1" smtClean="0">
+                        <a:rPr lang="en-GB" sz="1100" i="1">
                           <a:latin typeface="Cambria Math" panose="02040503050406030204" pitchFamily="18" charset="0"/>
-                          <a:ea typeface="Cambria Math" panose="02040503050406030204" pitchFamily="18" charset="0"/>
                         </a:rPr>
                         <m:t>=0.34</m:t>
                       </m:r>
                     </m:oMath>
                   </m:oMathPara>
                 </a14:m>
-                <a:endParaRPr lang="en-GB" sz="1200" dirty="0"/>
+                <a:endParaRPr lang="en-GB" sz="1100" i="1" dirty="0">
+                  <a:latin typeface="Cambria Math" panose="02040503050406030204" pitchFamily="18" charset="0"/>
+                </a:endParaRPr>
               </a:p>
               <a:p>
-                <a:endParaRPr lang="en-GB" sz="1200" dirty="0"/>
+                <a:endParaRPr lang="en-GB" sz="1100" i="1" dirty="0">
+                  <a:latin typeface="Cambria Math" panose="02040503050406030204" pitchFamily="18" charset="0"/>
+                </a:endParaRPr>
               </a:p>
               <a:p>
                 <a:pPr/>
@@ -21236,52 +21322,48 @@
                     </m:oMathParaPr>
                     <m:oMath xmlns:m="http://schemas.openxmlformats.org/officeDocument/2006/math">
                       <m:r>
-                        <a:rPr lang="en-GB" sz="1200" i="1">
+                        <a:rPr lang="en-GB" sz="1100" i="1">
                           <a:latin typeface="Cambria Math" panose="02040503050406030204" pitchFamily="18" charset="0"/>
                         </a:rPr>
                         <m:t>h</m:t>
                       </m:r>
                       <m:r>
-                        <a:rPr lang="en-GB" sz="1200" b="0" i="1" smtClean="0">
+                        <a:rPr lang="en-GB" sz="1100" i="1">
                           <a:latin typeface="Cambria Math" panose="02040503050406030204" pitchFamily="18" charset="0"/>
                         </a:rPr>
                         <m:t>= </m:t>
                       </m:r>
                       <m:r>
-                        <a:rPr lang="en-GB" sz="1200" b="0" i="1" smtClean="0">
+                        <a:rPr lang="en-GB" sz="1100" i="1">
                           <a:latin typeface="Cambria Math" panose="02040503050406030204" pitchFamily="18" charset="0"/>
-                          <a:ea typeface="Cambria Math" panose="02040503050406030204" pitchFamily="18" charset="0"/>
                         </a:rPr>
                         <m:t>𝜑</m:t>
                       </m:r>
                       <m:d>
                         <m:dPr>
                           <m:ctrlPr>
-                            <a:rPr lang="en-GB" sz="1200" b="0" i="1" smtClean="0">
+                            <a:rPr lang="en-GB" sz="1100" i="1">
                               <a:latin typeface="Cambria Math" panose="02040503050406030204" pitchFamily="18" charset="0"/>
-                              <a:ea typeface="Cambria Math" panose="02040503050406030204" pitchFamily="18" charset="0"/>
                             </a:rPr>
                           </m:ctrlPr>
                         </m:dPr>
                         <m:e>
                           <m:r>
-                            <a:rPr lang="en-GB" sz="1200" b="0" i="1" smtClean="0">
+                            <a:rPr lang="en-GB" sz="1100" i="1">
                               <a:latin typeface="Cambria Math" panose="02040503050406030204" pitchFamily="18" charset="0"/>
-                              <a:ea typeface="Cambria Math" panose="02040503050406030204" pitchFamily="18" charset="0"/>
                             </a:rPr>
                             <m:t>𝑧</m:t>
                           </m:r>
                         </m:e>
                       </m:d>
                       <m:r>
-                        <a:rPr lang="en-GB" sz="1200" b="0" i="1" smtClean="0">
+                        <a:rPr lang="en-GB" sz="1100" i="1">
                           <a:latin typeface="Cambria Math" panose="02040503050406030204" pitchFamily="18" charset="0"/>
-                          <a:ea typeface="Cambria Math" panose="02040503050406030204" pitchFamily="18" charset="0"/>
                         </a:rPr>
                         <m:t>= </m:t>
                       </m:r>
                       <m:r>
-                        <a:rPr lang="en-GB" sz="1200" b="0" i="1" smtClean="0">
+                        <a:rPr lang="en-GB" sz="1100" i="1">
                           <a:latin typeface="Cambria Math" panose="02040503050406030204" pitchFamily="18" charset="0"/>
                         </a:rPr>
                         <m:t>𝑅𝑒𝐿𝑈</m:t>
@@ -21289,14 +21371,14 @@
                       <m:d>
                         <m:dPr>
                           <m:ctrlPr>
-                            <a:rPr lang="en-GB" sz="1200" b="0" i="1" smtClean="0">
+                            <a:rPr lang="en-GB" sz="1100" i="1">
                               <a:latin typeface="Cambria Math" panose="02040503050406030204" pitchFamily="18" charset="0"/>
                             </a:rPr>
                           </m:ctrlPr>
                         </m:dPr>
                         <m:e>
                           <m:r>
-                            <a:rPr lang="en-GB" sz="1200" b="0" i="1" smtClean="0">
+                            <a:rPr lang="en-GB" sz="1100" i="1">
                               <a:latin typeface="Cambria Math" panose="02040503050406030204" pitchFamily="18" charset="0"/>
                             </a:rPr>
                             <m:t>𝑧</m:t>
@@ -21304,13 +21386,13 @@
                         </m:e>
                       </m:d>
                       <m:r>
-                        <a:rPr lang="en-GB" sz="1200" b="0" i="1" smtClean="0">
+                        <a:rPr lang="en-GB" sz="1100" i="1">
                           <a:latin typeface="Cambria Math" panose="02040503050406030204" pitchFamily="18" charset="0"/>
                         </a:rPr>
                         <m:t>=</m:t>
                       </m:r>
                       <m:r>
-                        <a:rPr lang="en-GB" sz="1200" b="0" i="1" smtClean="0">
+                        <a:rPr lang="en-GB" sz="1100" i="1">
                           <a:latin typeface="Cambria Math" panose="02040503050406030204" pitchFamily="18" charset="0"/>
                         </a:rPr>
                         <m:t>𝑅𝑒𝐿𝑈</m:t>
@@ -21318,14 +21400,14 @@
                       <m:d>
                         <m:dPr>
                           <m:ctrlPr>
-                            <a:rPr lang="en-GB" sz="1200" b="0" i="1" smtClean="0">
+                            <a:rPr lang="en-GB" sz="1100" i="1">
                               <a:latin typeface="Cambria Math" panose="02040503050406030204" pitchFamily="18" charset="0"/>
                             </a:rPr>
                           </m:ctrlPr>
                         </m:dPr>
                         <m:e>
                           <m:r>
-                            <a:rPr lang="en-GB" sz="1200" b="0" i="1" smtClean="0">
+                            <a:rPr lang="en-GB" sz="1100" i="1">
                               <a:latin typeface="Cambria Math" panose="02040503050406030204" pitchFamily="18" charset="0"/>
                             </a:rPr>
                             <m:t>0.34</m:t>
@@ -21333,7 +21415,7 @@
                         </m:e>
                       </m:d>
                       <m:r>
-                        <a:rPr lang="en-GB" sz="1200" b="0" i="1" smtClean="0">
+                        <a:rPr lang="en-GB" sz="1100" i="1">
                           <a:latin typeface="Cambria Math" panose="02040503050406030204" pitchFamily="18" charset="0"/>
                         </a:rPr>
                         <m:t>=</m:t>
@@ -21341,7 +21423,7 @@
                       <m:func>
                         <m:funcPr>
                           <m:ctrlPr>
-                            <a:rPr lang="en-GB" sz="1200" b="0" i="1" smtClean="0">
+                            <a:rPr lang="en-GB" sz="1100" i="1">
                               <a:latin typeface="Cambria Math" panose="02040503050406030204" pitchFamily="18" charset="0"/>
                             </a:rPr>
                           </m:ctrlPr>
@@ -21351,7 +21433,7 @@
                             <m:rPr>
                               <m:sty m:val="p"/>
                             </m:rPr>
-                            <a:rPr lang="en-GB" sz="1200" b="0" i="0" smtClean="0">
+                            <a:rPr lang="en-GB" sz="1100" i="1">
                               <a:latin typeface="Cambria Math" panose="02040503050406030204" pitchFamily="18" charset="0"/>
                             </a:rPr>
                             <m:t>max</m:t>
@@ -21361,14 +21443,14 @@
                           <m:d>
                             <m:dPr>
                               <m:ctrlPr>
-                                <a:rPr lang="en-GB" sz="1200" b="0" i="1" smtClean="0">
+                                <a:rPr lang="en-GB" sz="1100" i="1">
                                   <a:latin typeface="Cambria Math" panose="02040503050406030204" pitchFamily="18" charset="0"/>
                                 </a:rPr>
                               </m:ctrlPr>
                             </m:dPr>
                             <m:e>
                               <m:r>
-                                <a:rPr lang="en-GB" sz="1200" b="0" i="1" smtClean="0">
+                                <a:rPr lang="en-GB" sz="1100" i="1">
                                   <a:latin typeface="Cambria Math" panose="02040503050406030204" pitchFamily="18" charset="0"/>
                                 </a:rPr>
                                 <m:t>0, 0.34</m:t>
@@ -21378,7 +21460,7 @@
                         </m:e>
                       </m:func>
                       <m:r>
-                        <a:rPr lang="en-GB" sz="1200" b="0" i="1" smtClean="0">
+                        <a:rPr lang="en-GB" sz="1100" i="1">
                           <a:latin typeface="Cambria Math" panose="02040503050406030204" pitchFamily="18" charset="0"/>
                         </a:rPr>
                         <m:t>=0.34</m:t>
@@ -21386,10 +21468,14 @@
                     </m:oMath>
                   </m:oMathPara>
                 </a14:m>
-                <a:endParaRPr lang="en-GB" sz="1200" b="0" dirty="0"/>
+                <a:endParaRPr lang="en-GB" sz="1100" i="1" dirty="0">
+                  <a:latin typeface="Cambria Math" panose="02040503050406030204" pitchFamily="18" charset="0"/>
+                </a:endParaRPr>
               </a:p>
               <a:p>
-                <a:endParaRPr lang="en-GB" sz="1200" dirty="0"/>
+                <a:endParaRPr lang="en-GB" sz="1100" i="1" dirty="0">
+                  <a:latin typeface="Cambria Math" panose="02040503050406030204" pitchFamily="18" charset="0"/>
+                </a:endParaRPr>
               </a:p>
               <a:p>
                 <a:pPr/>
@@ -21400,49 +21486,28 @@
                     </m:oMathParaPr>
                     <m:oMath xmlns:m="http://schemas.openxmlformats.org/officeDocument/2006/math">
                       <m:r>
-                        <a:rPr lang="en-GB" sz="1200" b="0" i="1" smtClean="0">
+                        <a:rPr lang="en-GB" sz="1100" i="1">
                           <a:latin typeface="Cambria Math" panose="02040503050406030204" pitchFamily="18" charset="0"/>
                         </a:rPr>
                         <m:t>𝑜</m:t>
                       </m:r>
                       <m:r>
-                        <a:rPr lang="en-GB" sz="1200" b="0" i="1" smtClean="0">
+                        <a:rPr lang="en-GB" sz="1100" i="1">
                           <a:latin typeface="Cambria Math" panose="02040503050406030204" pitchFamily="18" charset="0"/>
                         </a:rPr>
-                        <m:t>=0.34 × 0.5</m:t>
-                      </m:r>
-                      <m:r>
-                        <a:rPr lang="en-GB" sz="1200" b="0" i="0" smtClean="0">
-                          <a:solidFill>
-                            <a:srgbClr val="7030A0"/>
-                          </a:solidFill>
-                          <a:latin typeface="Cambria Math" panose="02040503050406030204" pitchFamily="18" charset="0"/>
-                          <a:ea typeface="Cambria Math" panose="02040503050406030204" pitchFamily="18" charset="0"/>
-                        </a:rPr>
-                        <m:t>=</m:t>
-                      </m:r>
-                      <m:r>
-                        <a:rPr lang="en-GB" sz="1200" b="0" i="0" smtClean="0">
-                          <a:solidFill>
-                            <a:schemeClr val="tx1"/>
-                          </a:solidFill>
-                          <a:latin typeface="Cambria Math" panose="02040503050406030204" pitchFamily="18" charset="0"/>
-                          <a:ea typeface="Cambria Math" panose="02040503050406030204" pitchFamily="18" charset="0"/>
-                        </a:rPr>
-                        <m:t>0.17</m:t>
+                        <m:t>=0.34 × 0.5=0.17</m:t>
                       </m:r>
                     </m:oMath>
                   </m:oMathPara>
                 </a14:m>
-                <a:endParaRPr lang="en-GB" sz="1200" b="0" dirty="0">
-                  <a:solidFill>
-                    <a:schemeClr val="tx1"/>
-                  </a:solidFill>
-                  <a:ea typeface="Cambria Math" panose="02040503050406030204" pitchFamily="18" charset="0"/>
+                <a:endParaRPr lang="en-GB" sz="1100" i="1" dirty="0">
+                  <a:latin typeface="Cambria Math" panose="02040503050406030204" pitchFamily="18" charset="0"/>
                 </a:endParaRPr>
               </a:p>
               <a:p>
-                <a:endParaRPr lang="en-GB" sz="1200" dirty="0"/>
+                <a:endParaRPr lang="en-GB" sz="1100" i="1" dirty="0">
+                  <a:latin typeface="Cambria Math" panose="02040503050406030204" pitchFamily="18" charset="0"/>
+                </a:endParaRPr>
               </a:p>
               <a:p>
                 <a:pPr/>
@@ -21453,13 +21518,13 @@
                     </m:oMathParaPr>
                     <m:oMath xmlns:m="http://schemas.openxmlformats.org/officeDocument/2006/math">
                       <m:r>
-                        <a:rPr lang="en-GB" sz="1200" b="0" i="1" smtClean="0">
+                        <a:rPr lang="en-GB" sz="1100" i="1">
                           <a:latin typeface="Cambria Math" panose="02040503050406030204" pitchFamily="18" charset="0"/>
                         </a:rPr>
                         <m:t>𝑙</m:t>
                       </m:r>
                       <m:r>
-                        <a:rPr lang="en-GB" sz="1200" b="0" i="1" smtClean="0">
+                        <a:rPr lang="en-GB" sz="1100" i="1">
                           <a:latin typeface="Cambria Math" panose="02040503050406030204" pitchFamily="18" charset="0"/>
                         </a:rPr>
                         <m:t>=</m:t>
@@ -21467,14 +21532,14 @@
                       <m:sSup>
                         <m:sSupPr>
                           <m:ctrlPr>
-                            <a:rPr lang="en-GB" sz="1200" b="0" i="1" smtClean="0">
+                            <a:rPr lang="en-GB" sz="1100" i="1">
                               <a:latin typeface="Cambria Math" panose="02040503050406030204" pitchFamily="18" charset="0"/>
                             </a:rPr>
                           </m:ctrlPr>
                         </m:sSupPr>
                         <m:e>
                           <m:r>
-                            <a:rPr lang="en-GB" sz="1200" b="0" i="1" smtClean="0">
+                            <a:rPr lang="en-GB" sz="1100" i="1">
                               <a:latin typeface="Cambria Math" panose="02040503050406030204" pitchFamily="18" charset="0"/>
                             </a:rPr>
                             <m:t>(0.75−0.17)</m:t>
@@ -21482,7 +21547,7 @@
                         </m:e>
                         <m:sup>
                           <m:r>
-                            <a:rPr lang="en-GB" sz="1200" b="0" i="1" smtClean="0">
+                            <a:rPr lang="en-GB" sz="1100" i="1">
                               <a:latin typeface="Cambria Math" panose="02040503050406030204" pitchFamily="18" charset="0"/>
                             </a:rPr>
                             <m:t>2</m:t>
@@ -21490,7 +21555,7 @@
                         </m:sup>
                       </m:sSup>
                       <m:r>
-                        <a:rPr lang="en-GB" sz="1200" b="0" i="1" smtClean="0">
+                        <a:rPr lang="en-GB" sz="1100" i="1">
                           <a:latin typeface="Cambria Math" panose="02040503050406030204" pitchFamily="18" charset="0"/>
                         </a:rPr>
                         <m:t>=</m:t>
@@ -21499,16 +21564,22 @@
                         <m:rPr>
                           <m:nor/>
                         </m:rPr>
-                        <a:rPr lang="en-GB" sz="1200"/>
+                        <a:rPr lang="en-GB" sz="1100" i="1">
+                          <a:latin typeface="Cambria Math" panose="02040503050406030204" pitchFamily="18" charset="0"/>
+                        </a:rPr>
                         <m:t>0.3364</m:t>
                       </m:r>
                     </m:oMath>
                   </m:oMathPara>
                 </a14:m>
-                <a:endParaRPr lang="en-GB" sz="1200" dirty="0"/>
+                <a:endParaRPr lang="en-GB" sz="1100" i="1" dirty="0">
+                  <a:latin typeface="Cambria Math" panose="02040503050406030204" pitchFamily="18" charset="0"/>
+                </a:endParaRPr>
               </a:p>
               <a:p>
-                <a:endParaRPr lang="en-GB" sz="1200" dirty="0"/>
+                <a:endParaRPr lang="en-GB" sz="1100" i="1" dirty="0">
+                  <a:latin typeface="Cambria Math" panose="02040503050406030204" pitchFamily="18" charset="0"/>
+                </a:endParaRPr>
               </a:p>
               <a:p>
                 <a:pPr/>
@@ -21519,7 +21590,7 @@
                     </m:oMathParaPr>
                     <m:oMath xmlns:m="http://schemas.openxmlformats.org/officeDocument/2006/math">
                       <m:r>
-                        <a:rPr lang="en-GB" sz="1200" b="0" i="1" smtClean="0">
+                        <a:rPr lang="en-GB" sz="1100" i="1">
                           <a:latin typeface="Cambria Math" panose="02040503050406030204" pitchFamily="18" charset="0"/>
                         </a:rPr>
                         <m:t>𝑔𝑟𝑎</m:t>
@@ -21527,14 +21598,14 @@
                       <m:sSub>
                         <m:sSubPr>
                           <m:ctrlPr>
-                            <a:rPr lang="en-GB" sz="1200" b="0" i="1" smtClean="0">
+                            <a:rPr lang="en-GB" sz="1100" i="1">
                               <a:latin typeface="Cambria Math" panose="02040503050406030204" pitchFamily="18" charset="0"/>
                             </a:rPr>
                           </m:ctrlPr>
                         </m:sSubPr>
                         <m:e>
                           <m:r>
-                            <a:rPr lang="en-GB" sz="1200" b="0" i="1" smtClean="0">
+                            <a:rPr lang="en-GB" sz="1100" i="1">
                               <a:latin typeface="Cambria Math" panose="02040503050406030204" pitchFamily="18" charset="0"/>
                             </a:rPr>
                             <m:t>𝑑</m:t>
@@ -21544,14 +21615,14 @@
                           <m:sSub>
                             <m:sSubPr>
                               <m:ctrlPr>
-                                <a:rPr lang="en-GB" sz="1200" b="0" i="1" smtClean="0">
+                                <a:rPr lang="en-GB" sz="1100" i="1">
                                   <a:latin typeface="Cambria Math" panose="02040503050406030204" pitchFamily="18" charset="0"/>
                                 </a:rPr>
                               </m:ctrlPr>
                             </m:sSubPr>
                             <m:e>
                               <m:r>
-                                <a:rPr lang="en-GB" sz="1200" b="0" i="1" smtClean="0">
+                                <a:rPr lang="en-GB" sz="1100" i="1">
                                   <a:latin typeface="Cambria Math" panose="02040503050406030204" pitchFamily="18" charset="0"/>
                                 </a:rPr>
                                 <m:t>𝑦</m:t>
@@ -21559,7 +21630,7 @@
                             </m:e>
                             <m:sub>
                               <m:r>
-                                <a:rPr lang="en-GB" sz="1200" b="0" i="1" smtClean="0">
+                                <a:rPr lang="en-GB" sz="1100" i="1">
                                   <a:latin typeface="Cambria Math" panose="02040503050406030204" pitchFamily="18" charset="0"/>
                                 </a:rPr>
                                 <m:t>𝑝𝑟𝑒𝑑</m:t>
@@ -21569,24 +21640,16 @@
                         </m:sub>
                       </m:sSub>
                       <m:r>
-                        <a:rPr lang="en-GB" sz="1200" b="0" i="1" smtClean="0">
+                        <a:rPr lang="en-GB" sz="1100" i="1">
                           <a:latin typeface="Cambria Math" panose="02040503050406030204" pitchFamily="18" charset="0"/>
                         </a:rPr>
-                        <m:t>=2 </m:t>
-                      </m:r>
-                      <m:r>
-                        <a:rPr lang="en-GB" sz="1200" b="0" i="1" smtClean="0">
-                          <a:latin typeface="Cambria Math" panose="02040503050406030204" pitchFamily="18" charset="0"/>
-                          <a:ea typeface="Cambria Math" panose="02040503050406030204" pitchFamily="18" charset="0"/>
-                        </a:rPr>
-                        <m:t>× </m:t>
+                        <m:t>=2 × </m:t>
                       </m:r>
                       <m:d>
                         <m:dPr>
                           <m:ctrlPr>
-                            <a:rPr lang="en-GB" sz="1200" b="0" i="1" smtClean="0">
+                            <a:rPr lang="en-GB" sz="1100" i="1">
                               <a:latin typeface="Cambria Math" panose="02040503050406030204" pitchFamily="18" charset="0"/>
-                              <a:ea typeface="Cambria Math" panose="02040503050406030204" pitchFamily="18" charset="0"/>
                             </a:rPr>
                           </m:ctrlPr>
                         </m:dPr>
@@ -21594,127 +21657,115 @@
                           <m:sSub>
                             <m:sSubPr>
                               <m:ctrlPr>
-                                <a:rPr lang="en-GB" sz="1200" b="0" i="1" smtClean="0">
+                                <a:rPr lang="en-GB" sz="1100" i="1">
                                   <a:latin typeface="Cambria Math" panose="02040503050406030204" pitchFamily="18" charset="0"/>
-                                  <a:ea typeface="Cambria Math" panose="02040503050406030204" pitchFamily="18" charset="0"/>
                                 </a:rPr>
                               </m:ctrlPr>
                             </m:sSubPr>
                             <m:e>
                               <m:r>
-                                <a:rPr lang="en-GB" sz="1200" b="0" i="1" smtClean="0">
+                                <a:rPr lang="en-GB" sz="1100" i="1">
                                   <a:latin typeface="Cambria Math" panose="02040503050406030204" pitchFamily="18" charset="0"/>
-                                  <a:ea typeface="Cambria Math" panose="02040503050406030204" pitchFamily="18" charset="0"/>
                                 </a:rPr>
                                 <m:t>𝑦</m:t>
                               </m:r>
                             </m:e>
                             <m:sub>
                               <m:r>
-                                <a:rPr lang="en-GB" sz="1200" b="0" i="1" smtClean="0">
+                                <a:rPr lang="en-GB" sz="1100" i="1">
                                   <a:latin typeface="Cambria Math" panose="02040503050406030204" pitchFamily="18" charset="0"/>
-                                  <a:ea typeface="Cambria Math" panose="02040503050406030204" pitchFamily="18" charset="0"/>
                                 </a:rPr>
                                 <m:t>𝑝𝑟𝑒𝑑</m:t>
                               </m:r>
                             </m:sub>
                           </m:sSub>
                           <m:r>
-                            <a:rPr lang="en-GB" sz="1200" b="0" i="1" smtClean="0">
+                            <a:rPr lang="en-GB" sz="1100" i="1">
                               <a:latin typeface="Cambria Math" panose="02040503050406030204" pitchFamily="18" charset="0"/>
-                              <a:ea typeface="Cambria Math" panose="02040503050406030204" pitchFamily="18" charset="0"/>
                             </a:rPr>
                             <m:t>−</m:t>
                           </m:r>
                           <m:r>
-                            <a:rPr lang="en-GB" sz="1200" b="0" i="1" smtClean="0">
+                            <a:rPr lang="en-GB" sz="1100" i="1">
                               <a:latin typeface="Cambria Math" panose="02040503050406030204" pitchFamily="18" charset="0"/>
-                              <a:ea typeface="Cambria Math" panose="02040503050406030204" pitchFamily="18" charset="0"/>
                             </a:rPr>
                             <m:t>𝑦</m:t>
                           </m:r>
                         </m:e>
                       </m:d>
                       <m:r>
-                        <a:rPr lang="en-GB" sz="1200" b="0" i="1" smtClean="0">
+                        <a:rPr lang="en-GB" sz="1100" i="1">
                           <a:latin typeface="Cambria Math" panose="02040503050406030204" pitchFamily="18" charset="0"/>
-                          <a:ea typeface="Cambria Math" panose="02040503050406030204" pitchFamily="18" charset="0"/>
                         </a:rPr>
                         <m:t>=2 × </m:t>
                       </m:r>
                       <m:d>
                         <m:dPr>
                           <m:ctrlPr>
-                            <a:rPr lang="en-GB" sz="1200" b="0" i="1" smtClean="0">
+                            <a:rPr lang="en-GB" sz="1100" i="1">
                               <a:latin typeface="Cambria Math" panose="02040503050406030204" pitchFamily="18" charset="0"/>
-                              <a:ea typeface="Cambria Math" panose="02040503050406030204" pitchFamily="18" charset="0"/>
                             </a:rPr>
                           </m:ctrlPr>
                         </m:dPr>
                         <m:e>
                           <m:r>
-                            <a:rPr lang="en-GB" sz="1200" b="0" i="1" smtClean="0">
+                            <a:rPr lang="en-GB" sz="1100" i="1">
                               <a:latin typeface="Cambria Math" panose="02040503050406030204" pitchFamily="18" charset="0"/>
-                              <a:ea typeface="Cambria Math" panose="02040503050406030204" pitchFamily="18" charset="0"/>
                             </a:rPr>
                             <m:t>𝑜</m:t>
                           </m:r>
                           <m:r>
-                            <a:rPr lang="en-GB" sz="1200" b="0" i="1" smtClean="0">
+                            <a:rPr lang="en-GB" sz="1100" i="1">
                               <a:latin typeface="Cambria Math" panose="02040503050406030204" pitchFamily="18" charset="0"/>
-                              <a:ea typeface="Cambria Math" panose="02040503050406030204" pitchFamily="18" charset="0"/>
                             </a:rPr>
                             <m:t>−</m:t>
                           </m:r>
                           <m:r>
-                            <a:rPr lang="en-GB" sz="1200" b="0" i="1" smtClean="0">
+                            <a:rPr lang="en-GB" sz="1100" i="1">
                               <a:latin typeface="Cambria Math" panose="02040503050406030204" pitchFamily="18" charset="0"/>
-                              <a:ea typeface="Cambria Math" panose="02040503050406030204" pitchFamily="18" charset="0"/>
                             </a:rPr>
                             <m:t>𝑦</m:t>
                           </m:r>
                         </m:e>
                       </m:d>
                       <m:r>
-                        <a:rPr lang="en-GB" sz="1200" b="0" i="1" smtClean="0">
+                        <a:rPr lang="en-GB" sz="1100" i="1">
                           <a:latin typeface="Cambria Math" panose="02040503050406030204" pitchFamily="18" charset="0"/>
-                          <a:ea typeface="Cambria Math" panose="02040503050406030204" pitchFamily="18" charset="0"/>
                         </a:rPr>
                         <m:t>=2 × </m:t>
                       </m:r>
                       <m:d>
                         <m:dPr>
                           <m:ctrlPr>
-                            <a:rPr lang="en-GB" sz="1200" b="0" i="1" smtClean="0">
+                            <a:rPr lang="en-GB" sz="1100" i="1">
                               <a:latin typeface="Cambria Math" panose="02040503050406030204" pitchFamily="18" charset="0"/>
-                              <a:ea typeface="Cambria Math" panose="02040503050406030204" pitchFamily="18" charset="0"/>
                             </a:rPr>
                           </m:ctrlPr>
                         </m:dPr>
                         <m:e>
                           <m:r>
-                            <a:rPr lang="en-GB" sz="1200" b="0" i="1" smtClean="0">
+                            <a:rPr lang="en-GB" sz="1100" i="1">
                               <a:latin typeface="Cambria Math" panose="02040503050406030204" pitchFamily="18" charset="0"/>
-                              <a:ea typeface="Cambria Math" panose="02040503050406030204" pitchFamily="18" charset="0"/>
                             </a:rPr>
                             <m:t>0.75 −0.17</m:t>
                           </m:r>
                         </m:e>
                       </m:d>
                       <m:r>
-                        <a:rPr lang="en-GB" sz="1200" b="0" i="1" smtClean="0">
+                        <a:rPr lang="en-GB" sz="1100" i="1">
                           <a:latin typeface="Cambria Math" panose="02040503050406030204" pitchFamily="18" charset="0"/>
-                          <a:ea typeface="Cambria Math" panose="02040503050406030204" pitchFamily="18" charset="0"/>
                         </a:rPr>
                         <m:t>=1.16 </m:t>
                       </m:r>
                     </m:oMath>
                   </m:oMathPara>
                 </a14:m>
-                <a:endParaRPr lang="en-GB" sz="1200" dirty="0"/>
+                <a:endParaRPr lang="en-GB" sz="1100" i="1" dirty="0">
+                  <a:latin typeface="Cambria Math" panose="02040503050406030204" pitchFamily="18" charset="0"/>
+                </a:endParaRPr>
               </a:p>
               <a:p>
-                <a:endParaRPr lang="en-GB" sz="1200" b="0" i="1" dirty="0">
+                <a:endParaRPr lang="en-GB" sz="1100" i="1" dirty="0">
                   <a:latin typeface="Cambria Math" panose="02040503050406030204" pitchFamily="18" charset="0"/>
                 </a:endParaRPr>
               </a:p>
@@ -21722,7 +21773,7 @@
                 <a14:m>
                   <m:oMath xmlns:m="http://schemas.openxmlformats.org/officeDocument/2006/math">
                     <m:r>
-                      <a:rPr lang="en-GB" sz="1200" b="0" i="1" smtClean="0">
+                      <a:rPr lang="en-GB" sz="1100" i="1">
                         <a:latin typeface="Cambria Math" panose="02040503050406030204" pitchFamily="18" charset="0"/>
                       </a:rPr>
                       <m:t>𝑔𝑟𝑎</m:t>
@@ -21730,14 +21781,14 @@
                     <m:sSub>
                       <m:sSubPr>
                         <m:ctrlPr>
-                          <a:rPr lang="en-GB" sz="1200" b="0" i="1" smtClean="0">
+                          <a:rPr lang="en-GB" sz="1100" i="1">
                             <a:latin typeface="Cambria Math" panose="02040503050406030204" pitchFamily="18" charset="0"/>
                           </a:rPr>
                         </m:ctrlPr>
                       </m:sSubPr>
                       <m:e>
                         <m:r>
-                          <a:rPr lang="en-GB" sz="1200" b="0" i="1" smtClean="0">
+                          <a:rPr lang="en-GB" sz="1100" i="1">
                             <a:latin typeface="Cambria Math" panose="02040503050406030204" pitchFamily="18" charset="0"/>
                           </a:rPr>
                           <m:t>𝑑</m:t>
@@ -21745,13 +21796,13 @@
                       </m:e>
                       <m:sub>
                         <m:r>
-                          <a:rPr lang="en-GB" sz="1200" b="0" i="1" smtClean="0">
+                          <a:rPr lang="en-GB" sz="1100" i="1">
                             <a:latin typeface="Cambria Math" panose="02040503050406030204" pitchFamily="18" charset="0"/>
                           </a:rPr>
                           <m:t>𝑤</m:t>
                         </m:r>
                         <m:r>
-                          <a:rPr lang="en-GB" sz="1200" b="0" i="1" smtClean="0">
+                          <a:rPr lang="en-GB" sz="1100" i="1">
                             <a:latin typeface="Cambria Math" panose="02040503050406030204" pitchFamily="18" charset="0"/>
                           </a:rPr>
                           <m:t>2</m:t>
@@ -21759,20 +21810,13 @@
                       </m:sub>
                     </m:sSub>
                     <m:r>
-                      <a:rPr lang="en-GB" sz="1200" b="0" i="0" smtClean="0">
+                      <a:rPr lang="en-GB" sz="1100" i="1">
                         <a:latin typeface="Cambria Math" panose="02040503050406030204" pitchFamily="18" charset="0"/>
                       </a:rPr>
-                      <m:t>=0.5 </m:t>
+                      <m:t>=0.5 ×</m:t>
                     </m:r>
                     <m:r>
-                      <a:rPr lang="en-GB" sz="1200" b="0" i="1" smtClean="0">
-                        <a:latin typeface="Cambria Math" panose="02040503050406030204" pitchFamily="18" charset="0"/>
-                        <a:ea typeface="Cambria Math" panose="02040503050406030204" pitchFamily="18" charset="0"/>
-                      </a:rPr>
-                      <m:t>×</m:t>
-                    </m:r>
-                    <m:r>
-                      <a:rPr lang="en-GB" sz="1200" i="1">
+                      <a:rPr lang="en-GB" sz="1100" i="1">
                         <a:latin typeface="Cambria Math" panose="02040503050406030204" pitchFamily="18" charset="0"/>
                       </a:rPr>
                       <m:t>𝑔𝑟𝑎</m:t>
@@ -21780,14 +21824,14 @@
                     <m:sSub>
                       <m:sSubPr>
                         <m:ctrlPr>
-                          <a:rPr lang="en-GB" sz="1200" i="1">
+                          <a:rPr lang="en-GB" sz="1100" i="1">
                             <a:latin typeface="Cambria Math" panose="02040503050406030204" pitchFamily="18" charset="0"/>
                           </a:rPr>
                         </m:ctrlPr>
                       </m:sSubPr>
                       <m:e>
                         <m:r>
-                          <a:rPr lang="en-GB" sz="1200" i="1">
+                          <a:rPr lang="en-GB" sz="1100" i="1">
                             <a:latin typeface="Cambria Math" panose="02040503050406030204" pitchFamily="18" charset="0"/>
                           </a:rPr>
                           <m:t>𝑑</m:t>
@@ -21797,14 +21841,14 @@
                         <m:sSub>
                           <m:sSubPr>
                             <m:ctrlPr>
-                              <a:rPr lang="en-GB" sz="1200" i="1">
+                              <a:rPr lang="en-GB" sz="1100" i="1">
                                 <a:latin typeface="Cambria Math" panose="02040503050406030204" pitchFamily="18" charset="0"/>
                               </a:rPr>
                             </m:ctrlPr>
                           </m:sSubPr>
                           <m:e>
                             <m:r>
-                              <a:rPr lang="en-GB" sz="1200" i="1">
+                              <a:rPr lang="en-GB" sz="1100" i="1">
                                 <a:latin typeface="Cambria Math" panose="02040503050406030204" pitchFamily="18" charset="0"/>
                               </a:rPr>
                               <m:t>𝑦</m:t>
@@ -21812,7 +21856,7 @@
                           </m:e>
                           <m:sub>
                             <m:r>
-                              <a:rPr lang="en-GB" sz="1200" i="1">
+                              <a:rPr lang="en-GB" sz="1100" i="1">
                                 <a:latin typeface="Cambria Math" panose="02040503050406030204" pitchFamily="18" charset="0"/>
                               </a:rPr>
                               <m:t>𝑝𝑟𝑒𝑑</m:t>
@@ -21822,67 +21866,33 @@
                       </m:sub>
                     </m:sSub>
                     <m:r>
-                      <a:rPr lang="en-GB" sz="1200" b="0" i="1" smtClean="0">
+                      <a:rPr lang="en-GB" sz="1100" i="1">
                         <a:latin typeface="Cambria Math" panose="02040503050406030204" pitchFamily="18" charset="0"/>
                       </a:rPr>
-                      <m:t>=0.5 </m:t>
+                      <m:t>=0.5 × 1.16=</m:t>
                     </m:r>
                     <m:r>
-                      <a:rPr lang="en-GB" sz="1200" b="0" i="1" smtClean="0">
-                        <a:latin typeface="Cambria Math" panose="02040503050406030204" pitchFamily="18" charset="0"/>
-                        <a:ea typeface="Cambria Math" panose="02040503050406030204" pitchFamily="18" charset="0"/>
-                      </a:rPr>
-                      <m:t>× 1.16=</m:t>
-                    </m:r>
-                    <m:r>
-                      <a:rPr lang="en-GB" sz="1200" b="1" i="1" smtClean="0">
+                      <a:rPr lang="en-GB" sz="1100" i="0" smtClean="0">
                         <a:solidFill>
-                          <a:srgbClr val="FF0000"/>
+                          <a:srgbClr val="C00000"/>
                         </a:solidFill>
                         <a:latin typeface="Cambria Math" panose="02040503050406030204" pitchFamily="18" charset="0"/>
-                        <a:ea typeface="Cambria Math" panose="02040503050406030204" pitchFamily="18" charset="0"/>
                       </a:rPr>
-                      <m:t>𝟎</m:t>
-                    </m:r>
-                    <m:r>
-                      <a:rPr lang="en-GB" sz="1200" b="1" i="1" smtClean="0">
-                        <a:solidFill>
-                          <a:srgbClr val="FF0000"/>
-                        </a:solidFill>
-                        <a:latin typeface="Cambria Math" panose="02040503050406030204" pitchFamily="18" charset="0"/>
-                        <a:ea typeface="Cambria Math" panose="02040503050406030204" pitchFamily="18" charset="0"/>
-                      </a:rPr>
-                      <m:t>.</m:t>
-                    </m:r>
-                    <m:r>
-                      <a:rPr lang="en-GB" sz="1200" b="1" i="1" smtClean="0">
-                        <a:solidFill>
-                          <a:srgbClr val="FF0000"/>
-                        </a:solidFill>
-                        <a:latin typeface="Cambria Math" panose="02040503050406030204" pitchFamily="18" charset="0"/>
-                        <a:ea typeface="Cambria Math" panose="02040503050406030204" pitchFamily="18" charset="0"/>
-                      </a:rPr>
-                      <m:t>𝟓𝟖</m:t>
-                    </m:r>
-                    <m:r>
-                      <a:rPr lang="en-GB" sz="1200" b="1" i="1" smtClean="0">
-                        <a:solidFill>
-                          <a:srgbClr val="FF0000"/>
-                        </a:solidFill>
-                        <a:latin typeface="Cambria Math" panose="02040503050406030204" pitchFamily="18" charset="0"/>
-                        <a:ea typeface="Cambria Math" panose="02040503050406030204" pitchFamily="18" charset="0"/>
-                      </a:rPr>
-                      <m:t> </m:t>
+                      <m:t>0.58 </m:t>
                     </m:r>
                   </m:oMath>
                 </a14:m>
                 <a:r>
-                  <a:rPr lang="en-GB" sz="1200" dirty="0"/>
+                  <a:rPr lang="en-GB" sz="1100" dirty="0">
+                    <a:latin typeface="Cambria Math" panose="02040503050406030204" pitchFamily="18" charset="0"/>
+                  </a:rPr>
                   <a:t> </a:t>
                 </a:r>
               </a:p>
               <a:p>
-                <a:endParaRPr lang="en-GB" sz="1200" dirty="0"/>
+                <a:endParaRPr lang="en-GB" sz="1100" i="1" dirty="0">
+                  <a:latin typeface="Cambria Math" panose="02040503050406030204" pitchFamily="18" charset="0"/>
+                </a:endParaRPr>
               </a:p>
               <a:p>
                 <a:pPr/>
@@ -21893,7 +21903,7 @@
                     </m:oMathParaPr>
                     <m:oMath xmlns:m="http://schemas.openxmlformats.org/officeDocument/2006/math">
                       <m:r>
-                        <a:rPr lang="en-GB" sz="1200" b="0" i="1" smtClean="0">
+                        <a:rPr lang="en-GB" sz="1100" i="1">
                           <a:latin typeface="Cambria Math" panose="02040503050406030204" pitchFamily="18" charset="0"/>
                         </a:rPr>
                         <m:t>𝑔𝑟𝑎</m:t>
@@ -21901,14 +21911,14 @@
                       <m:sSub>
                         <m:sSubPr>
                           <m:ctrlPr>
-                            <a:rPr lang="en-GB" sz="1200" b="0" i="1" smtClean="0">
+                            <a:rPr lang="en-GB" sz="1100" i="1">
                               <a:latin typeface="Cambria Math" panose="02040503050406030204" pitchFamily="18" charset="0"/>
                             </a:rPr>
                           </m:ctrlPr>
                         </m:sSubPr>
                         <m:e>
                           <m:r>
-                            <a:rPr lang="en-GB" sz="1200" b="0" i="1" smtClean="0">
+                            <a:rPr lang="en-GB" sz="1100" i="1">
                               <a:latin typeface="Cambria Math" panose="02040503050406030204" pitchFamily="18" charset="0"/>
                             </a:rPr>
                             <m:t>𝑑</m:t>
@@ -21916,7 +21926,7 @@
                         </m:e>
                         <m:sub>
                           <m:r>
-                            <a:rPr lang="en-GB" sz="1200" b="0" i="1" smtClean="0">
+                            <a:rPr lang="en-GB" sz="1100" i="1">
                               <a:latin typeface="Cambria Math" panose="02040503050406030204" pitchFamily="18" charset="0"/>
                             </a:rPr>
                             <m:t>h</m:t>
@@ -21924,20 +21934,13 @@
                         </m:sub>
                       </m:sSub>
                       <m:r>
-                        <a:rPr lang="en-GB" sz="1200" b="0" i="0" smtClean="0">
+                        <a:rPr lang="en-GB" sz="1100" i="1">
                           <a:latin typeface="Cambria Math" panose="02040503050406030204" pitchFamily="18" charset="0"/>
                         </a:rPr>
-                        <m:t>=0.34 </m:t>
+                        <m:t>=0.34 ×</m:t>
                       </m:r>
                       <m:r>
-                        <a:rPr lang="en-GB" sz="1200" b="0" i="1" smtClean="0">
-                          <a:latin typeface="Cambria Math" panose="02040503050406030204" pitchFamily="18" charset="0"/>
-                          <a:ea typeface="Cambria Math" panose="02040503050406030204" pitchFamily="18" charset="0"/>
-                        </a:rPr>
-                        <m:t>×</m:t>
-                      </m:r>
-                      <m:r>
-                        <a:rPr lang="en-GB" sz="1200" i="1">
+                        <a:rPr lang="en-GB" sz="1100" i="1">
                           <a:latin typeface="Cambria Math" panose="02040503050406030204" pitchFamily="18" charset="0"/>
                         </a:rPr>
                         <m:t>𝑔𝑟𝑎</m:t>
@@ -21945,14 +21948,14 @@
                       <m:sSub>
                         <m:sSubPr>
                           <m:ctrlPr>
-                            <a:rPr lang="en-GB" sz="1200" i="1">
+                            <a:rPr lang="en-GB" sz="1100" i="1">
                               <a:latin typeface="Cambria Math" panose="02040503050406030204" pitchFamily="18" charset="0"/>
                             </a:rPr>
                           </m:ctrlPr>
                         </m:sSubPr>
                         <m:e>
                           <m:r>
-                            <a:rPr lang="en-GB" sz="1200" i="1">
+                            <a:rPr lang="en-GB" sz="1100" i="1">
                               <a:latin typeface="Cambria Math" panose="02040503050406030204" pitchFamily="18" charset="0"/>
                             </a:rPr>
                             <m:t>𝑑</m:t>
@@ -21962,14 +21965,14 @@
                           <m:sSub>
                             <m:sSubPr>
                               <m:ctrlPr>
-                                <a:rPr lang="en-GB" sz="1200" i="1">
+                                <a:rPr lang="en-GB" sz="1100" i="1">
                                   <a:latin typeface="Cambria Math" panose="02040503050406030204" pitchFamily="18" charset="0"/>
                                 </a:rPr>
                               </m:ctrlPr>
                             </m:sSubPr>
                             <m:e>
                               <m:r>
-                                <a:rPr lang="en-GB" sz="1200" i="1">
+                                <a:rPr lang="en-GB" sz="1100" i="1">
                                   <a:latin typeface="Cambria Math" panose="02040503050406030204" pitchFamily="18" charset="0"/>
                                 </a:rPr>
                                 <m:t>𝑦</m:t>
@@ -21977,7 +21980,7 @@
                             </m:e>
                             <m:sub>
                               <m:r>
-                                <a:rPr lang="en-GB" sz="1200" i="1">
+                                <a:rPr lang="en-GB" sz="1100" i="1">
                                   <a:latin typeface="Cambria Math" panose="02040503050406030204" pitchFamily="18" charset="0"/>
                                 </a:rPr>
                                 <m:t>𝑝𝑟𝑒𝑑</m:t>
@@ -21987,36 +21990,40 @@
                         </m:sub>
                       </m:sSub>
                       <m:r>
-                        <a:rPr lang="en-GB" sz="1200" b="0" i="1" smtClean="0">
+                        <a:rPr lang="en-GB" sz="1100" i="1">
                           <a:latin typeface="Cambria Math" panose="02040503050406030204" pitchFamily="18" charset="0"/>
                         </a:rPr>
-                        <m:t>=0.34 </m:t>
+                        <m:t>=0.34 × </m:t>
                       </m:r>
                       <m:r>
-                        <a:rPr lang="en-GB" sz="1200" b="0" i="1" smtClean="0">
+                        <a:rPr lang="en-GB" sz="1100" i="0">
                           <a:latin typeface="Cambria Math" panose="02040503050406030204" pitchFamily="18" charset="0"/>
-                          <a:ea typeface="Cambria Math" panose="02040503050406030204" pitchFamily="18" charset="0"/>
                         </a:rPr>
-                        <m:t>× 1.16=</m:t>
+                        <m:t>1.16=</m:t>
                       </m:r>
                       <m:r>
                         <m:rPr>
                           <m:nor/>
                         </m:rPr>
-                        <a:rPr lang="en-GB" sz="1200" b="1" smtClean="0">
+                        <a:rPr lang="en-GB" sz="1100" smtClean="0">
                           <a:solidFill>
-                            <a:srgbClr val="7030A0"/>
+                            <a:srgbClr val="C00000"/>
                           </a:solidFill>
+                          <a:latin typeface="Cambria Math" panose="02040503050406030204" pitchFamily="18" charset="0"/>
                         </a:rPr>
                         <m:t>0.3944</m:t>
                       </m:r>
                     </m:oMath>
                   </m:oMathPara>
                 </a14:m>
-                <a:endParaRPr lang="en-GB" sz="1200" b="1" dirty="0"/>
+                <a:endParaRPr lang="en-GB" sz="1100" dirty="0">
+                  <a:latin typeface="Cambria Math" panose="02040503050406030204" pitchFamily="18" charset="0"/>
+                </a:endParaRPr>
               </a:p>
               <a:p>
-                <a:endParaRPr lang="en-GB" sz="1200" b="1" dirty="0"/>
+                <a:endParaRPr lang="en-GB" sz="1100" i="1" dirty="0">
+                  <a:latin typeface="Cambria Math" panose="02040503050406030204" pitchFamily="18" charset="0"/>
+                </a:endParaRPr>
               </a:p>
               <a:p>
                 <a:pPr/>
@@ -22027,7 +22034,7 @@
                     </m:oMathParaPr>
                     <m:oMath xmlns:m="http://schemas.openxmlformats.org/officeDocument/2006/math">
                       <m:r>
-                        <a:rPr lang="en-GB" sz="1200" b="0" i="1" smtClean="0">
+                        <a:rPr lang="en-GB" sz="1100" i="1">
                           <a:latin typeface="Cambria Math" panose="02040503050406030204" pitchFamily="18" charset="0"/>
                         </a:rPr>
                         <m:t>𝑔𝑟𝑎</m:t>
@@ -22035,14 +22042,14 @@
                       <m:sSub>
                         <m:sSubPr>
                           <m:ctrlPr>
-                            <a:rPr lang="en-GB" sz="1200" b="0" i="1" smtClean="0">
+                            <a:rPr lang="en-GB" sz="1100" i="1">
                               <a:latin typeface="Cambria Math" panose="02040503050406030204" pitchFamily="18" charset="0"/>
                             </a:rPr>
                           </m:ctrlPr>
                         </m:sSubPr>
                         <m:e>
                           <m:r>
-                            <a:rPr lang="en-GB" sz="1200" b="0" i="1" smtClean="0">
+                            <a:rPr lang="en-GB" sz="1100" i="1">
                               <a:latin typeface="Cambria Math" panose="02040503050406030204" pitchFamily="18" charset="0"/>
                             </a:rPr>
                             <m:t>𝑑</m:t>
@@ -22050,13 +22057,13 @@
                         </m:e>
                         <m:sub>
                           <m:r>
-                            <a:rPr lang="en-GB" sz="1200" b="0" i="1" smtClean="0">
+                            <a:rPr lang="en-GB" sz="1100" i="1">
                               <a:latin typeface="Cambria Math" panose="02040503050406030204" pitchFamily="18" charset="0"/>
                             </a:rPr>
                             <m:t>𝑤</m:t>
                           </m:r>
                           <m:r>
-                            <a:rPr lang="en-GB" sz="1200" b="0" i="1" smtClean="0">
+                            <a:rPr lang="en-GB" sz="1100" i="1">
                               <a:latin typeface="Cambria Math" panose="02040503050406030204" pitchFamily="18" charset="0"/>
                             </a:rPr>
                             <m:t>11</m:t>
@@ -22064,7 +22071,7 @@
                         </m:sub>
                       </m:sSub>
                       <m:r>
-                        <a:rPr lang="en-GB" sz="1200" b="0" i="0" smtClean="0">
+                        <a:rPr lang="en-GB" sz="1100" i="1">
                           <a:latin typeface="Cambria Math" panose="02040503050406030204" pitchFamily="18" charset="0"/>
                         </a:rPr>
                         <m:t>=</m:t>
@@ -22073,26 +22080,19 @@
                         <m:rPr>
                           <m:sty m:val="p"/>
                         </m:rPr>
-                        <a:rPr lang="en-GB" sz="1200" b="0" i="0" smtClean="0">
+                        <a:rPr lang="en-GB" sz="1100" i="1">
                           <a:latin typeface="Cambria Math" panose="02040503050406030204" pitchFamily="18" charset="0"/>
                         </a:rPr>
                         <m:t>w</m:t>
                       </m:r>
                       <m:r>
-                        <a:rPr lang="en-GB" sz="1200" b="0" i="0" smtClean="0">
+                        <a:rPr lang="en-GB" sz="1100" i="1">
                           <a:latin typeface="Cambria Math" panose="02040503050406030204" pitchFamily="18" charset="0"/>
                         </a:rPr>
-                        <m:t>11 </m:t>
+                        <m:t>11 ×</m:t>
                       </m:r>
                       <m:r>
-                        <a:rPr lang="en-GB" sz="1200" b="0" i="1" smtClean="0">
-                          <a:latin typeface="Cambria Math" panose="02040503050406030204" pitchFamily="18" charset="0"/>
-                          <a:ea typeface="Cambria Math" panose="02040503050406030204" pitchFamily="18" charset="0"/>
-                        </a:rPr>
-                        <m:t>×</m:t>
-                      </m:r>
-                      <m:r>
-                        <a:rPr lang="en-GB" sz="1200" i="1">
+                        <a:rPr lang="en-GB" sz="1100" i="1">
                           <a:latin typeface="Cambria Math" panose="02040503050406030204" pitchFamily="18" charset="0"/>
                         </a:rPr>
                         <m:t>𝑔𝑟𝑎</m:t>
@@ -22100,14 +22100,14 @@
                       <m:sSub>
                         <m:sSubPr>
                           <m:ctrlPr>
-                            <a:rPr lang="en-GB" sz="1200" i="1">
+                            <a:rPr lang="en-GB" sz="1100" i="1">
                               <a:latin typeface="Cambria Math" panose="02040503050406030204" pitchFamily="18" charset="0"/>
                             </a:rPr>
                           </m:ctrlPr>
                         </m:sSubPr>
                         <m:e>
                           <m:r>
-                            <a:rPr lang="en-GB" sz="1200" i="1">
+                            <a:rPr lang="en-GB" sz="1100" i="1">
                               <a:latin typeface="Cambria Math" panose="02040503050406030204" pitchFamily="18" charset="0"/>
                             </a:rPr>
                             <m:t>𝑑</m:t>
@@ -22115,7 +22115,7 @@
                         </m:e>
                         <m:sub>
                           <m:r>
-                            <a:rPr lang="en-GB" sz="1200" b="0" i="1" smtClean="0">
+                            <a:rPr lang="en-GB" sz="1100" i="1">
                               <a:latin typeface="Cambria Math" panose="02040503050406030204" pitchFamily="18" charset="0"/>
                             </a:rPr>
                             <m:t>h</m:t>
@@ -22123,33 +22123,35 @@
                         </m:sub>
                       </m:sSub>
                       <m:r>
-                        <a:rPr lang="en-GB" sz="1200" b="0" i="0" smtClean="0">
+                        <a:rPr lang="en-GB" sz="1100" i="1">
                           <a:latin typeface="Cambria Math" panose="02040503050406030204" pitchFamily="18" charset="0"/>
                         </a:rPr>
-                        <m:t>=0.2 </m:t>
+                        <m:t>=0.2 × </m:t>
                       </m:r>
                       <m:r>
-                        <a:rPr lang="en-GB" sz="1200" b="0" i="1" smtClean="0">
+                        <a:rPr lang="en-GB" sz="1100" i="0">
                           <a:latin typeface="Cambria Math" panose="02040503050406030204" pitchFamily="18" charset="0"/>
-                          <a:ea typeface="Cambria Math" panose="02040503050406030204" pitchFamily="18" charset="0"/>
                         </a:rPr>
-                        <m:t>× 0.394=</m:t>
+                        <m:t>0.394=</m:t>
                       </m:r>
                       <m:r>
                         <m:rPr>
                           <m:nor/>
                         </m:rPr>
-                        <a:rPr lang="en-GB" sz="1200" b="1" smtClean="0">
+                        <a:rPr lang="en-GB" sz="1100" smtClean="0">
                           <a:solidFill>
-                            <a:srgbClr val="FF0000"/>
+                            <a:srgbClr val="C00000"/>
                           </a:solidFill>
+                          <a:latin typeface="Cambria Math" panose="02040503050406030204" pitchFamily="18" charset="0"/>
                         </a:rPr>
                         <m:t>0.0788</m:t>
                       </m:r>
                     </m:oMath>
                   </m:oMathPara>
                 </a14:m>
-                <a:endParaRPr lang="en-GB" sz="1200" b="1" dirty="0"/>
+                <a:endParaRPr lang="en-GB" sz="1100" dirty="0">
+                  <a:latin typeface="Cambria Math" panose="02040503050406030204" pitchFamily="18" charset="0"/>
+                </a:endParaRPr>
               </a:p>
             </p:txBody>
           </p:sp>
@@ -22171,8 +22173,8 @@
             </p:nvSpPr>
             <p:spPr>
               <a:xfrm>
-                <a:off x="729725" y="2577967"/>
-                <a:ext cx="4971169" cy="3054554"/>
+                <a:off x="513489" y="2548867"/>
+                <a:ext cx="4563109" cy="2741328"/>
               </a:xfrm>
               <a:prstGeom prst="rect">
                 <a:avLst/>
@@ -23075,7 +23077,7 @@
         <p:spPr>
           <a:xfrm>
             <a:off x="5949238" y="2577967"/>
-            <a:ext cx="3054041" cy="738664"/>
+            <a:ext cx="3169457" cy="1169551"/>
           </a:xfrm>
           <a:prstGeom prst="rect">
             <a:avLst/>
@@ -23090,7 +23092,23 @@
           <a:p>
             <a:r>
               <a:rPr lang="en-GB" sz="1400" dirty="0"/>
-              <a:t>w1 = w1 – (</a:t>
+              <a:t>w</a:t>
+            </a:r>
+            <a:r>
+              <a:rPr lang="en-GB" sz="1400" baseline="-25000" dirty="0"/>
+              <a:t>11</a:t>
+            </a:r>
+            <a:r>
+              <a:rPr lang="en-GB" sz="1400" dirty="0"/>
+              <a:t> = w</a:t>
+            </a:r>
+            <a:r>
+              <a:rPr lang="en-GB" sz="1400" baseline="-25000" dirty="0"/>
+              <a:t>11</a:t>
+            </a:r>
+            <a:r>
+              <a:rPr lang="en-GB" sz="1400" dirty="0"/>
+              <a:t> – (</a:t>
             </a:r>
             <a:r>
               <a:rPr lang="en-GB" sz="1400" dirty="0" err="1"/>
@@ -23098,7 +23116,91 @@
             </a:r>
             <a:r>
               <a:rPr lang="en-GB" sz="1400" dirty="0"/>
-              <a:t> * grad_w1)</a:t>
+              <a:t> * grad_w</a:t>
+            </a:r>
+            <a:r>
+              <a:rPr lang="en-GB" sz="1400" baseline="-25000" dirty="0"/>
+              <a:t>11</a:t>
+            </a:r>
+            <a:r>
+              <a:rPr lang="en-GB" sz="1400" dirty="0"/>
+              <a:t>)</a:t>
+            </a:r>
+          </a:p>
+          <a:p>
+            <a:r>
+              <a:rPr lang="en-GB" sz="1400" dirty="0"/>
+              <a:t>w</a:t>
+            </a:r>
+            <a:r>
+              <a:rPr lang="en-GB" sz="1400" baseline="-25000" dirty="0"/>
+              <a:t>12</a:t>
+            </a:r>
+            <a:r>
+              <a:rPr lang="en-GB" sz="1400" dirty="0"/>
+              <a:t> = w</a:t>
+            </a:r>
+            <a:r>
+              <a:rPr lang="en-GB" sz="1400" baseline="-25000" dirty="0"/>
+              <a:t>12</a:t>
+            </a:r>
+            <a:r>
+              <a:rPr lang="en-GB" sz="1400" dirty="0"/>
+              <a:t> – (</a:t>
+            </a:r>
+            <a:r>
+              <a:rPr lang="en-GB" sz="1400" dirty="0" err="1"/>
+              <a:t>learning_rate</a:t>
+            </a:r>
+            <a:r>
+              <a:rPr lang="en-GB" sz="1400" dirty="0"/>
+              <a:t> * grad_w</a:t>
+            </a:r>
+            <a:r>
+              <a:rPr lang="en-GB" sz="1400" baseline="-25000" dirty="0"/>
+              <a:t>12</a:t>
+            </a:r>
+            <a:r>
+              <a:rPr lang="en-GB" sz="1400" dirty="0"/>
+              <a:t>)</a:t>
+            </a:r>
+          </a:p>
+          <a:p>
+            <a:r>
+              <a:rPr lang="en-GB" sz="1400" dirty="0"/>
+              <a:t>w</a:t>
+            </a:r>
+            <a:r>
+              <a:rPr lang="en-GB" sz="1400" baseline="-25000" dirty="0"/>
+              <a:t>13</a:t>
+            </a:r>
+            <a:r>
+              <a:rPr lang="en-GB" sz="1400" dirty="0"/>
+              <a:t> = w</a:t>
+            </a:r>
+            <a:r>
+              <a:rPr lang="en-GB" sz="1400" baseline="-25000" dirty="0"/>
+              <a:t>13</a:t>
+            </a:r>
+            <a:r>
+              <a:rPr lang="en-GB" sz="1400" dirty="0"/>
+              <a:t> – (</a:t>
+            </a:r>
+            <a:r>
+              <a:rPr lang="en-GB" sz="1400" dirty="0" err="1"/>
+              <a:t>learning_rate</a:t>
+            </a:r>
+            <a:r>
+              <a:rPr lang="en-GB" sz="1400" dirty="0"/>
+              <a:t> * grad_w</a:t>
+            </a:r>
+            <a:r>
+              <a:rPr lang="en-GB" sz="1400" baseline="-25000" dirty="0"/>
+              <a:t>13</a:t>
+            </a:r>
+            <a:r>
+              <a:rPr lang="en-GB" sz="1400" dirty="0"/>
+              <a:t>)</a:t>
             </a:r>
           </a:p>
           <a:p>
@@ -23107,7 +23209,23 @@
           <a:p>
             <a:r>
               <a:rPr lang="en-GB" sz="1400" dirty="0"/>
-              <a:t>w2 = w2 – (</a:t>
+              <a:t>w</a:t>
+            </a:r>
+            <a:r>
+              <a:rPr lang="en-GB" sz="1400" baseline="-25000" dirty="0"/>
+              <a:t>2</a:t>
+            </a:r>
+            <a:r>
+              <a:rPr lang="en-GB" sz="1400" dirty="0"/>
+              <a:t> = w</a:t>
+            </a:r>
+            <a:r>
+              <a:rPr lang="en-GB" sz="1400" baseline="-25000" dirty="0"/>
+              <a:t>2</a:t>
+            </a:r>
+            <a:r>
+              <a:rPr lang="en-GB" sz="1400" dirty="0"/>
+              <a:t> – (</a:t>
             </a:r>
             <a:r>
               <a:rPr lang="en-GB" sz="1400" dirty="0" err="1"/>
@@ -24133,42 +24251,6 @@
           </a:p>
         </p:txBody>
       </p:sp>
-      <p:pic>
-        <p:nvPicPr>
-          <p:cNvPr id="5" name="Picture 4" descr="Diagram, schematic&#10;&#10;Description automatically generated">
-            <a:extLst>
-              <a:ext uri="{FF2B5EF4-FFF2-40B4-BE49-F238E27FC236}">
-                <a16:creationId xmlns:a16="http://schemas.microsoft.com/office/drawing/2014/main" id="{CECA6847-30EA-024E-0AB8-5A67DED67368}"/>
-              </a:ext>
-            </a:extLst>
-          </p:cNvPr>
-          <p:cNvPicPr>
-            <a:picLocks noChangeAspect="1"/>
-          </p:cNvPicPr>
-          <p:nvPr/>
-        </p:nvPicPr>
-        <p:blipFill>
-          <a:blip r:embed="rId3">
-            <a:extLst>
-              <a:ext uri="{28A0092B-C50C-407E-A947-70E740481C1C}">
-                <a14:useLocalDpi xmlns:a14="http://schemas.microsoft.com/office/drawing/2010/main" val="0"/>
-              </a:ext>
-            </a:extLst>
-          </a:blip>
-          <a:stretch>
-            <a:fillRect/>
-          </a:stretch>
-        </p:blipFill>
-        <p:spPr>
-          <a:xfrm>
-            <a:off x="2267744" y="1967834"/>
-            <a:ext cx="2781300" cy="876300"/>
-          </a:xfrm>
-          <a:prstGeom prst="rect">
-            <a:avLst/>
-          </a:prstGeom>
-        </p:spPr>
-      </p:pic>
     </p:spTree>
     <p:extLst>
       <p:ext uri="{BB962C8B-B14F-4D97-AF65-F5344CB8AC3E}">
@@ -25376,7 +25458,7 @@
           <p:cNvPr id="2" name="Title 1">
             <a:extLst>
               <a:ext uri="{FF2B5EF4-FFF2-40B4-BE49-F238E27FC236}">
-                <a16:creationId xmlns:a16="http://schemas.microsoft.com/office/drawing/2014/main" id="{E994EDC9-1FB1-56DB-50C4-C6F53570C96D}"/>
+                <a16:creationId xmlns:a16="http://schemas.microsoft.com/office/drawing/2014/main" id="{91333766-FE10-9FEE-3399-FA9A94A5C328}"/>
               </a:ext>
             </a:extLst>
           </p:cNvPr>
@@ -25394,69 +25476,17 @@
           <a:p>
             <a:r>
               <a:rPr lang="en-GB" dirty="0"/>
-              <a:t>How to choose the number of hidden layers</a:t>
+              <a:t>Adam*</a:t>
             </a:r>
           </a:p>
         </p:txBody>
       </p:sp>
       <p:sp>
         <p:nvSpPr>
-          <p:cNvPr id="3" name="Content Placeholder 2">
-            <a:extLst>
-              <a:ext uri="{FF2B5EF4-FFF2-40B4-BE49-F238E27FC236}">
-                <a16:creationId xmlns:a16="http://schemas.microsoft.com/office/drawing/2014/main" id="{1F7C7359-681B-9616-D015-A0DE3E93B5EB}"/>
-              </a:ext>
-            </a:extLst>
-          </p:cNvPr>
-          <p:cNvSpPr>
-            <a:spLocks noGrp="1"/>
-          </p:cNvSpPr>
-          <p:nvPr>
-            <p:ph idx="1"/>
-          </p:nvPr>
-        </p:nvSpPr>
-        <p:spPr/>
-        <p:txBody>
-          <a:bodyPr/>
-          <a:lstStyle/>
-          <a:p>
-            <a:r>
-              <a:rPr lang="en-GB" dirty="0"/>
-              <a:t>This depends on the complexity of the data and the decision boundaries (i.e. how separable the data is).</a:t>
-            </a:r>
-          </a:p>
-          <a:p>
-            <a:r>
-              <a:rPr lang="en-GB" dirty="0"/>
-              <a:t>This could also depend on the number of features/dimension. </a:t>
-            </a:r>
-          </a:p>
-          <a:p>
-            <a:r>
-              <a:rPr lang="en-GB" dirty="0"/>
-              <a:t>A very basic recommendation, for less complex problems, 2 to 3 hidden layers and for more complex problems 3 to 5 hidden layers could be used.</a:t>
-            </a:r>
-          </a:p>
-          <a:p>
-            <a:r>
-              <a:rPr lang="en-GB" dirty="0"/>
-              <a:t>Several deep learning architectures use more layers; the more layers you add, the more hyperparameters to train and optimise. This adds to the complexity of your network and would impact the convergence (and overfitting) of your network. </a:t>
-            </a:r>
-          </a:p>
-          <a:p>
-            <a:r>
-              <a:rPr lang="en-GB" dirty="0"/>
-              <a:t>The number of neurons in hidden layers is also important (width) of the network. </a:t>
-            </a:r>
-          </a:p>
-        </p:txBody>
-      </p:sp>
-      <p:sp>
-        <p:nvSpPr>
-          <p:cNvPr id="4" name="Slide Number Placeholder 3">
-            <a:extLst>
-              <a:ext uri="{FF2B5EF4-FFF2-40B4-BE49-F238E27FC236}">
-                <a16:creationId xmlns:a16="http://schemas.microsoft.com/office/drawing/2014/main" id="{2C5465D0-D4A4-DEF3-9F16-7FA9A13565B5}"/>
+          <p:cNvPr id="3" name="Slide Number Placeholder 2">
+            <a:extLst>
+              <a:ext uri="{FF2B5EF4-FFF2-40B4-BE49-F238E27FC236}">
+                <a16:creationId xmlns:a16="http://schemas.microsoft.com/office/drawing/2014/main" id="{C3C5712F-C7A5-3B52-4AC5-DA1CF39611B5}"/>
               </a:ext>
             </a:extLst>
           </p:cNvPr>
@@ -25472,7 +25502,7 @@
           <a:bodyPr/>
           <a:lstStyle/>
           <a:p>
-            <a:fld id="{44E22EE9-B8A0-0641-9265-052CFE9B95A7}" type="slidenum">
+            <a:fld id="{BB98F552-A29D-2D4E-8192-F20670493719}" type="slidenum">
               <a:rPr lang="en-GB" altLang="en-US" smtClean="0"/>
               <a:pPr/>
               <a:t>47</a:t>
@@ -25481,10 +25511,94 @@
           </a:p>
         </p:txBody>
       </p:sp>
+      <p:pic>
+        <p:nvPicPr>
+          <p:cNvPr id="7" name="Picture 6" descr="Graphical user interface, text, application&#10;&#10;Description automatically generated">
+            <a:extLst>
+              <a:ext uri="{FF2B5EF4-FFF2-40B4-BE49-F238E27FC236}">
+                <a16:creationId xmlns:a16="http://schemas.microsoft.com/office/drawing/2014/main" id="{49F23DFC-D6CE-CDDD-D9A8-E5C6C98EBE64}"/>
+              </a:ext>
+            </a:extLst>
+          </p:cNvPr>
+          <p:cNvPicPr>
+            <a:picLocks noChangeAspect="1"/>
+          </p:cNvPicPr>
+          <p:nvPr/>
+        </p:nvPicPr>
+        <p:blipFill>
+          <a:blip r:embed="rId2">
+            <a:extLst>
+              <a:ext uri="{28A0092B-C50C-407E-A947-70E740481C1C}">
+                <a14:useLocalDpi xmlns:a14="http://schemas.microsoft.com/office/drawing/2010/main" val="0"/>
+              </a:ext>
+            </a:extLst>
+          </a:blip>
+          <a:stretch>
+            <a:fillRect/>
+          </a:stretch>
+        </p:blipFill>
+        <p:spPr>
+          <a:xfrm>
+            <a:off x="1928464" y="137778"/>
+            <a:ext cx="5287071" cy="5321900"/>
+          </a:xfrm>
+          <a:prstGeom prst="rect">
+            <a:avLst/>
+          </a:prstGeom>
+        </p:spPr>
+      </p:pic>
+      <p:sp>
+        <p:nvSpPr>
+          <p:cNvPr id="9" name="TextBox 8">
+            <a:extLst>
+              <a:ext uri="{FF2B5EF4-FFF2-40B4-BE49-F238E27FC236}">
+                <a16:creationId xmlns:a16="http://schemas.microsoft.com/office/drawing/2014/main" id="{390B251D-0B5D-A4F2-5FC9-BE81D8A6AEEA}"/>
+              </a:ext>
+            </a:extLst>
+          </p:cNvPr>
+          <p:cNvSpPr txBox="1"/>
+          <p:nvPr/>
+        </p:nvSpPr>
+        <p:spPr>
+          <a:xfrm>
+            <a:off x="251520" y="5470425"/>
+            <a:ext cx="6534472" cy="261610"/>
+          </a:xfrm>
+          <a:prstGeom prst="rect">
+            <a:avLst/>
+          </a:prstGeom>
+          <a:noFill/>
+        </p:spPr>
+        <p:txBody>
+          <a:bodyPr wrap="square">
+            <a:spAutoFit/>
+          </a:bodyPr>
+          <a:lstStyle/>
+          <a:p>
+            <a:r>
+              <a:rPr lang="en-GB" sz="1050" dirty="0"/>
+              <a:t>See: https://</a:t>
+            </a:r>
+            <a:r>
+              <a:rPr lang="en-GB" sz="1050" dirty="0" err="1"/>
+              <a:t>pytorch.org</a:t>
+            </a:r>
+            <a:r>
+              <a:rPr lang="en-GB" sz="1050" dirty="0"/>
+              <a:t>/docs/stable/generated/</a:t>
+            </a:r>
+            <a:r>
+              <a:rPr lang="en-GB" sz="1050" dirty="0" err="1"/>
+              <a:t>torch.optim.Adam.html</a:t>
+            </a:r>
+            <a:endParaRPr lang="en-GB" sz="1050" dirty="0"/>
+          </a:p>
+        </p:txBody>
+      </p:sp>
     </p:spTree>
     <p:extLst>
       <p:ext uri="{BB962C8B-B14F-4D97-AF65-F5344CB8AC3E}">
-        <p14:creationId xmlns:p14="http://schemas.microsoft.com/office/powerpoint/2010/main" val="925935974"/>
+        <p14:creationId xmlns:p14="http://schemas.microsoft.com/office/powerpoint/2010/main" val="758628971"/>
       </p:ext>
     </p:extLst>
   </p:cSld>
@@ -25516,7 +25630,7 @@
           <p:cNvPr id="2" name="Title 1">
             <a:extLst>
               <a:ext uri="{FF2B5EF4-FFF2-40B4-BE49-F238E27FC236}">
-                <a16:creationId xmlns:a16="http://schemas.microsoft.com/office/drawing/2014/main" id="{15D1A8DE-2C1E-6DD1-57E7-8A36003CD83B}"/>
+                <a16:creationId xmlns:a16="http://schemas.microsoft.com/office/drawing/2014/main" id="{E994EDC9-1FB1-56DB-50C4-C6F53570C96D}"/>
               </a:ext>
             </a:extLst>
           </p:cNvPr>
@@ -25534,7 +25648,7 @@
           <a:p>
             <a:r>
               <a:rPr lang="en-GB" dirty="0"/>
-              <a:t>Dropouts</a:t>
+              <a:t>How to choose the number of hidden layers</a:t>
             </a:r>
           </a:p>
         </p:txBody>
@@ -25544,7 +25658,7 @@
           <p:cNvPr id="3" name="Content Placeholder 2">
             <a:extLst>
               <a:ext uri="{FF2B5EF4-FFF2-40B4-BE49-F238E27FC236}">
-                <a16:creationId xmlns:a16="http://schemas.microsoft.com/office/drawing/2014/main" id="{DD573F29-A55F-B7FD-B367-576E9520D8DE}"/>
+                <a16:creationId xmlns:a16="http://schemas.microsoft.com/office/drawing/2014/main" id="{1F7C7359-681B-9616-D015-A0DE3E93B5EB}"/>
               </a:ext>
             </a:extLst>
           </p:cNvPr>
@@ -25562,27 +25676,31 @@
           <a:p>
             <a:r>
               <a:rPr lang="en-GB" dirty="0"/>
-              <a:t>Dropout is a regularisation technique to reduce the risk of </a:t>
-            </a:r>
-            <a:r>
-              <a:rPr lang="en-GB" dirty="0" err="1"/>
-              <a:t>overftinng</a:t>
-            </a:r>
+              <a:t>This depends on the complexity of the data and the decision boundaries (i.e. how separable the data is).</a:t>
+            </a:r>
+          </a:p>
+          <a:p>
             <a:r>
               <a:rPr lang="en-GB" dirty="0"/>
-              <a:t> in neural networks. </a:t>
+              <a:t>This could also depend on the number of features/dimension. </a:t>
             </a:r>
           </a:p>
           <a:p>
             <a:r>
               <a:rPr lang="en-GB" dirty="0"/>
-              <a:t>In neural networks it refers to dropping input and hidden layer nodes temporarily. </a:t>
+              <a:t>A very basic recommendation, for less complex problems, 2 to 3 hidden layers and for more complex problems 3 to 5 hidden layers could be used.</a:t>
             </a:r>
           </a:p>
           <a:p>
             <a:r>
               <a:rPr lang="en-GB" dirty="0"/>
-              <a:t>This creates a new temporary architecture by randomly dropping a percentage of the nodes during the training process.  </a:t>
+              <a:t>Several deep learning architectures use more layers; the more layers you add, the more hyperparameters to train and optimise. This adds to the complexity of your network and would impact the convergence (and overfitting) of your network. </a:t>
+            </a:r>
+          </a:p>
+          <a:p>
+            <a:r>
+              <a:rPr lang="en-GB" dirty="0"/>
+              <a:t>The number of neurons in hidden layers is also important (width) of the network. </a:t>
             </a:r>
           </a:p>
         </p:txBody>
@@ -25592,7 +25710,7 @@
           <p:cNvPr id="4" name="Slide Number Placeholder 3">
             <a:extLst>
               <a:ext uri="{FF2B5EF4-FFF2-40B4-BE49-F238E27FC236}">
-                <a16:creationId xmlns:a16="http://schemas.microsoft.com/office/drawing/2014/main" id="{5BFB722E-4157-7FCE-67BF-341FE0A193F0}"/>
+                <a16:creationId xmlns:a16="http://schemas.microsoft.com/office/drawing/2014/main" id="{2C5465D0-D4A4-DEF3-9F16-7FA9A13565B5}"/>
               </a:ext>
             </a:extLst>
           </p:cNvPr>
@@ -25620,7 +25738,7 @@
     </p:spTree>
     <p:extLst>
       <p:ext uri="{BB962C8B-B14F-4D97-AF65-F5344CB8AC3E}">
-        <p14:creationId xmlns:p14="http://schemas.microsoft.com/office/powerpoint/2010/main" val="2284764444"/>
+        <p14:creationId xmlns:p14="http://schemas.microsoft.com/office/powerpoint/2010/main" val="925935974"/>
       </p:ext>
     </p:extLst>
   </p:cSld>
@@ -25652,7 +25770,7 @@
           <p:cNvPr id="2" name="Title 1">
             <a:extLst>
               <a:ext uri="{FF2B5EF4-FFF2-40B4-BE49-F238E27FC236}">
-                <a16:creationId xmlns:a16="http://schemas.microsoft.com/office/drawing/2014/main" id="{E417C415-CD99-1C4A-A0DE-7D0BF31D9A22}"/>
+                <a16:creationId xmlns:a16="http://schemas.microsoft.com/office/drawing/2014/main" id="{15D1A8DE-2C1E-6DD1-57E7-8A36003CD83B}"/>
               </a:ext>
             </a:extLst>
           </p:cNvPr>
@@ -25669,8 +25787,8 @@
           <a:lstStyle/>
           <a:p>
             <a:r>
-              <a:rPr lang="en-US" dirty="0"/>
-              <a:t>Dropout – philosophy </a:t>
+              <a:rPr lang="en-GB" dirty="0"/>
+              <a:t>Dropouts</a:t>
             </a:r>
           </a:p>
         </p:txBody>
@@ -25680,7 +25798,7 @@
           <p:cNvPr id="3" name="Content Placeholder 2">
             <a:extLst>
               <a:ext uri="{FF2B5EF4-FFF2-40B4-BE49-F238E27FC236}">
-                <a16:creationId xmlns:a16="http://schemas.microsoft.com/office/drawing/2014/main" id="{2069F820-089D-C846-A018-B35AF74BD8E7}"/>
+                <a16:creationId xmlns:a16="http://schemas.microsoft.com/office/drawing/2014/main" id="{DD573F29-A55F-B7FD-B367-576E9520D8DE}"/>
               </a:ext>
             </a:extLst>
           </p:cNvPr>
@@ -25697,32 +25815,20 @@
           <a:lstStyle/>
           <a:p>
             <a:r>
-              <a:rPr lang="en-US" dirty="0"/>
-              <a:t>A key idea behind applying dropout is that training a neural network with adding a stochastic </a:t>
-            </a:r>
-            <a:r>
-              <a:rPr lang="en-US" dirty="0" err="1"/>
-              <a:t>behaviour</a:t>
-            </a:r>
-            <a:r>
-              <a:rPr lang="en-US" dirty="0"/>
-              <a:t> and making predictions and averaging over multiple stochastic decisions simulate a from of bagging with parameter sharing. </a:t>
-            </a:r>
-            <a:br>
-              <a:rPr lang="en-US" dirty="0"/>
-            </a:br>
-            <a:endParaRPr lang="en-US" dirty="0"/>
-          </a:p>
-          <a:p>
-            <a:r>
-              <a:rPr lang="en-US" dirty="0"/>
-              <a:t>In Bagging (i.e., bootstrap aggregation) several models are combined to reduce the generalization error. </a:t>
-            </a:r>
-          </a:p>
-          <a:p>
-            <a:r>
-              <a:rPr lang="en-US" dirty="0"/>
-              <a:t>The idea of Bagging is to train multiple models separately, then use all the models to vote on the output for the test example. </a:t>
+              <a:rPr lang="en-GB" dirty="0"/>
+              <a:t>Dropout is a regularisation technique to reduce the risk of overfitting in neural networks. </a:t>
+            </a:r>
+          </a:p>
+          <a:p>
+            <a:r>
+              <a:rPr lang="en-GB" dirty="0"/>
+              <a:t>In neural networks it refers to dropping input and hidden layer nodes temporarily. </a:t>
+            </a:r>
+          </a:p>
+          <a:p>
+            <a:r>
+              <a:rPr lang="en-GB" dirty="0"/>
+              <a:t>This creates a new temporary architecture by randomly dropping a percentage of the nodes during the training process.  </a:t>
             </a:r>
           </a:p>
         </p:txBody>
@@ -25732,7 +25838,7 @@
           <p:cNvPr id="4" name="Slide Number Placeholder 3">
             <a:extLst>
               <a:ext uri="{FF2B5EF4-FFF2-40B4-BE49-F238E27FC236}">
-                <a16:creationId xmlns:a16="http://schemas.microsoft.com/office/drawing/2014/main" id="{BB392E95-10A7-FE45-86AE-B8B534FF88D5}"/>
+                <a16:creationId xmlns:a16="http://schemas.microsoft.com/office/drawing/2014/main" id="{5BFB722E-4157-7FCE-67BF-341FE0A193F0}"/>
               </a:ext>
             </a:extLst>
           </p:cNvPr>
@@ -25753,14 +25859,14 @@
               <a:pPr/>
               <a:t>49</a:t>
             </a:fld>
-            <a:endParaRPr lang="en-GB" altLang="en-US"/>
+            <a:endParaRPr lang="en-GB" altLang="en-US" dirty="0"/>
           </a:p>
         </p:txBody>
       </p:sp>
     </p:spTree>
     <p:extLst>
       <p:ext uri="{BB962C8B-B14F-4D97-AF65-F5344CB8AC3E}">
-        <p14:creationId xmlns:p14="http://schemas.microsoft.com/office/powerpoint/2010/main" val="161025796"/>
+        <p14:creationId xmlns:p14="http://schemas.microsoft.com/office/powerpoint/2010/main" val="2284764444"/>
       </p:ext>
     </p:extLst>
   </p:cSld>
@@ -27365,7 +27471,7 @@
           <p:cNvPr id="2" name="Title 1">
             <a:extLst>
               <a:ext uri="{FF2B5EF4-FFF2-40B4-BE49-F238E27FC236}">
-                <a16:creationId xmlns:a16="http://schemas.microsoft.com/office/drawing/2014/main" id="{F47D11AA-1D7C-3946-95CF-74F16E24AD33}"/>
+                <a16:creationId xmlns:a16="http://schemas.microsoft.com/office/drawing/2014/main" id="{E417C415-CD99-1C4A-A0DE-7D0BF31D9A22}"/>
               </a:ext>
             </a:extLst>
           </p:cNvPr>
@@ -27383,7 +27489,7 @@
           <a:p>
             <a:r>
               <a:rPr lang="en-US" dirty="0"/>
-              <a:t>Dropouts – practical notes</a:t>
+              <a:t>Dropout – philosophy </a:t>
             </a:r>
           </a:p>
         </p:txBody>
@@ -27393,7 +27499,7 @@
           <p:cNvPr id="3" name="Content Placeholder 2">
             <a:extLst>
               <a:ext uri="{FF2B5EF4-FFF2-40B4-BE49-F238E27FC236}">
-                <a16:creationId xmlns:a16="http://schemas.microsoft.com/office/drawing/2014/main" id="{4B9A335C-5133-B14E-999A-7E0AB18725CF}"/>
+                <a16:creationId xmlns:a16="http://schemas.microsoft.com/office/drawing/2014/main" id="{2069F820-089D-C846-A018-B35AF74BD8E7}"/>
               </a:ext>
             </a:extLst>
           </p:cNvPr>
@@ -27411,13 +27517,31 @@
           <a:p>
             <a:r>
               <a:rPr lang="en-US" dirty="0"/>
-              <a:t>When the training sample is very small, dropout method is not very effective. </a:t>
-            </a:r>
-          </a:p>
-          <a:p>
+              <a:t>A key idea behind applying dropout is that training a neural network with adding a stochastic </a:t>
+            </a:r>
+            <a:r>
+              <a:rPr lang="en-US" dirty="0" err="1"/>
+              <a:t>behaviour</a:t>
+            </a:r>
             <a:r>
               <a:rPr lang="en-US" dirty="0"/>
-              <a:t>When additional unlabeled samples are available,  unsupervised feature learning can improve the performance better than dropout. </a:t>
+              <a:t> and making predictions and averaging over multiple stochastic decisions simulate a from of bagging with parameter sharing. </a:t>
+            </a:r>
+            <a:br>
+              <a:rPr lang="en-US" dirty="0"/>
+            </a:br>
+            <a:endParaRPr lang="en-US" dirty="0"/>
+          </a:p>
+          <a:p>
+            <a:r>
+              <a:rPr lang="en-US" dirty="0"/>
+              <a:t>In Bagging (i.e., bootstrap aggregation) several models are combined to reduce the generalization error. </a:t>
+            </a:r>
+          </a:p>
+          <a:p>
+            <a:r>
+              <a:rPr lang="en-US" dirty="0"/>
+              <a:t>The idea of Bagging is to train multiple models separately, then use all the models to vote on the output for the test example. </a:t>
             </a:r>
           </a:p>
         </p:txBody>
@@ -27427,7 +27551,7 @@
           <p:cNvPr id="4" name="Slide Number Placeholder 3">
             <a:extLst>
               <a:ext uri="{FF2B5EF4-FFF2-40B4-BE49-F238E27FC236}">
-                <a16:creationId xmlns:a16="http://schemas.microsoft.com/office/drawing/2014/main" id="{1ACE8931-EB8D-CD41-A57D-53DE989BFFA6}"/>
+                <a16:creationId xmlns:a16="http://schemas.microsoft.com/office/drawing/2014/main" id="{BB392E95-10A7-FE45-86AE-B8B534FF88D5}"/>
               </a:ext>
             </a:extLst>
           </p:cNvPr>
@@ -27455,7 +27579,7 @@
     </p:spTree>
     <p:extLst>
       <p:ext uri="{BB962C8B-B14F-4D97-AF65-F5344CB8AC3E}">
-        <p14:creationId xmlns:p14="http://schemas.microsoft.com/office/powerpoint/2010/main" val="249466988"/>
+        <p14:creationId xmlns:p14="http://schemas.microsoft.com/office/powerpoint/2010/main" val="161025796"/>
       </p:ext>
     </p:extLst>
   </p:cSld>
@@ -27487,7 +27611,7 @@
           <p:cNvPr id="2" name="Title 1">
             <a:extLst>
               <a:ext uri="{FF2B5EF4-FFF2-40B4-BE49-F238E27FC236}">
-                <a16:creationId xmlns:a16="http://schemas.microsoft.com/office/drawing/2014/main" id="{78616E43-D9E7-EAFB-B262-A31B30E918AF}"/>
+                <a16:creationId xmlns:a16="http://schemas.microsoft.com/office/drawing/2014/main" id="{F47D11AA-1D7C-3946-95CF-74F16E24AD33}"/>
               </a:ext>
             </a:extLst>
           </p:cNvPr>
@@ -27504,8 +27628,42 @@
           <a:lstStyle/>
           <a:p>
             <a:r>
-              <a:rPr lang="en-GB" dirty="0"/>
-              <a:t>Example - 1</a:t>
+              <a:rPr lang="en-US" dirty="0"/>
+              <a:t>Dropouts – practical notes</a:t>
+            </a:r>
+          </a:p>
+        </p:txBody>
+      </p:sp>
+      <p:sp>
+        <p:nvSpPr>
+          <p:cNvPr id="3" name="Content Placeholder 2">
+            <a:extLst>
+              <a:ext uri="{FF2B5EF4-FFF2-40B4-BE49-F238E27FC236}">
+                <a16:creationId xmlns:a16="http://schemas.microsoft.com/office/drawing/2014/main" id="{4B9A335C-5133-B14E-999A-7E0AB18725CF}"/>
+              </a:ext>
+            </a:extLst>
+          </p:cNvPr>
+          <p:cNvSpPr>
+            <a:spLocks noGrp="1"/>
+          </p:cNvSpPr>
+          <p:nvPr>
+            <p:ph idx="1"/>
+          </p:nvPr>
+        </p:nvSpPr>
+        <p:spPr/>
+        <p:txBody>
+          <a:bodyPr/>
+          <a:lstStyle/>
+          <a:p>
+            <a:r>
+              <a:rPr lang="en-US" dirty="0"/>
+              <a:t>When the training sample is very small, dropout method is not very effective. </a:t>
+            </a:r>
+          </a:p>
+          <a:p>
+            <a:r>
+              <a:rPr lang="en-US" dirty="0"/>
+              <a:t>When additional unlabeled samples are available,  unsupervised feature learning can improve the performance better than dropout. </a:t>
             </a:r>
           </a:p>
         </p:txBody>
@@ -27515,7 +27673,7 @@
           <p:cNvPr id="4" name="Slide Number Placeholder 3">
             <a:extLst>
               <a:ext uri="{FF2B5EF4-FFF2-40B4-BE49-F238E27FC236}">
-                <a16:creationId xmlns:a16="http://schemas.microsoft.com/office/drawing/2014/main" id="{4864D2B5-AE09-EBF0-4970-14A56F072F71}"/>
+                <a16:creationId xmlns:a16="http://schemas.microsoft.com/office/drawing/2014/main" id="{1ACE8931-EB8D-CD41-A57D-53DE989BFFA6}"/>
               </a:ext>
             </a:extLst>
           </p:cNvPr>
@@ -27536,50 +27694,14 @@
               <a:pPr/>
               <a:t>51</a:t>
             </a:fld>
-            <a:endParaRPr lang="en-GB" altLang="en-US" dirty="0"/>
+            <a:endParaRPr lang="en-GB" altLang="en-US"/>
           </a:p>
         </p:txBody>
       </p:sp>
-      <p:pic>
-        <p:nvPicPr>
-          <p:cNvPr id="6" name="Picture 5" descr="Diagram&#10;&#10;Description automatically generated">
-            <a:extLst>
-              <a:ext uri="{FF2B5EF4-FFF2-40B4-BE49-F238E27FC236}">
-                <a16:creationId xmlns:a16="http://schemas.microsoft.com/office/drawing/2014/main" id="{A44E03E5-18C4-DDFA-77C6-DFCA035E494B}"/>
-              </a:ext>
-            </a:extLst>
-          </p:cNvPr>
-          <p:cNvPicPr>
-            <a:picLocks noChangeAspect="1"/>
-          </p:cNvPicPr>
-          <p:nvPr/>
-        </p:nvPicPr>
-        <p:blipFill>
-          <a:blip r:embed="rId2">
-            <a:extLst>
-              <a:ext uri="{28A0092B-C50C-407E-A947-70E740481C1C}">
-                <a14:useLocalDpi xmlns:a14="http://schemas.microsoft.com/office/drawing/2010/main" val="0"/>
-              </a:ext>
-            </a:extLst>
-          </a:blip>
-          <a:stretch>
-            <a:fillRect/>
-          </a:stretch>
-        </p:blipFill>
-        <p:spPr>
-          <a:xfrm>
-            <a:off x="685800" y="1417340"/>
-            <a:ext cx="7772400" cy="2303284"/>
-          </a:xfrm>
-          <a:prstGeom prst="rect">
-            <a:avLst/>
-          </a:prstGeom>
-        </p:spPr>
-      </p:pic>
     </p:spTree>
     <p:extLst>
       <p:ext uri="{BB962C8B-B14F-4D97-AF65-F5344CB8AC3E}">
-        <p14:creationId xmlns:p14="http://schemas.microsoft.com/office/powerpoint/2010/main" val="240174982"/>
+        <p14:creationId xmlns:p14="http://schemas.microsoft.com/office/powerpoint/2010/main" val="249466988"/>
       </p:ext>
     </p:extLst>
   </p:cSld>
@@ -27611,7 +27733,7 @@
           <p:cNvPr id="2" name="Title 1">
             <a:extLst>
               <a:ext uri="{FF2B5EF4-FFF2-40B4-BE49-F238E27FC236}">
-                <a16:creationId xmlns:a16="http://schemas.microsoft.com/office/drawing/2014/main" id="{6559DECC-2000-3CD9-3EA1-DD3CF1A76BAC}"/>
+                <a16:creationId xmlns:a16="http://schemas.microsoft.com/office/drawing/2014/main" id="{78616E43-D9E7-EAFB-B262-A31B30E918AF}"/>
               </a:ext>
             </a:extLst>
           </p:cNvPr>
@@ -27629,17 +27751,17 @@
           <a:p>
             <a:r>
               <a:rPr lang="en-GB" dirty="0"/>
-              <a:t>Example -2</a:t>
+              <a:t>Example - 1</a:t>
             </a:r>
           </a:p>
         </p:txBody>
       </p:sp>
       <p:sp>
         <p:nvSpPr>
-          <p:cNvPr id="3" name="Slide Number Placeholder 2">
-            <a:extLst>
-              <a:ext uri="{FF2B5EF4-FFF2-40B4-BE49-F238E27FC236}">
-                <a16:creationId xmlns:a16="http://schemas.microsoft.com/office/drawing/2014/main" id="{140944EA-A188-89FB-9F9D-2230006EF847}"/>
+          <p:cNvPr id="4" name="Slide Number Placeholder 3">
+            <a:extLst>
+              <a:ext uri="{FF2B5EF4-FFF2-40B4-BE49-F238E27FC236}">
+                <a16:creationId xmlns:a16="http://schemas.microsoft.com/office/drawing/2014/main" id="{4864D2B5-AE09-EBF0-4970-14A56F072F71}"/>
               </a:ext>
             </a:extLst>
           </p:cNvPr>
@@ -27655,7 +27777,7 @@
           <a:bodyPr/>
           <a:lstStyle/>
           <a:p>
-            <a:fld id="{BB98F552-A29D-2D4E-8192-F20670493719}" type="slidenum">
+            <a:fld id="{44E22EE9-B8A0-0641-9265-052CFE9B95A7}" type="slidenum">
               <a:rPr lang="en-GB" altLang="en-US" smtClean="0"/>
               <a:pPr/>
               <a:t>52</a:t>
@@ -27666,10 +27788,10 @@
       </p:sp>
       <p:pic>
         <p:nvPicPr>
-          <p:cNvPr id="4" name="Picture 3" descr="Diagram&#10;&#10;Description automatically generated">
-            <a:extLst>
-              <a:ext uri="{FF2B5EF4-FFF2-40B4-BE49-F238E27FC236}">
-                <a16:creationId xmlns:a16="http://schemas.microsoft.com/office/drawing/2014/main" id="{BB3D4226-A77B-ED36-9701-4BDEA821D450}"/>
+          <p:cNvPr id="6" name="Picture 5" descr="Diagram&#10;&#10;Description automatically generated">
+            <a:extLst>
+              <a:ext uri="{FF2B5EF4-FFF2-40B4-BE49-F238E27FC236}">
+                <a16:creationId xmlns:a16="http://schemas.microsoft.com/office/drawing/2014/main" id="{A44E03E5-18C4-DDFA-77C6-DFCA035E494B}"/>
               </a:ext>
             </a:extLst>
           </p:cNvPr>
@@ -27692,8 +27814,8 @@
         </p:blipFill>
         <p:spPr>
           <a:xfrm>
-            <a:off x="884997" y="646002"/>
-            <a:ext cx="7772400" cy="4672124"/>
+            <a:off x="685800" y="1417340"/>
+            <a:ext cx="7772400" cy="2303284"/>
           </a:xfrm>
           <a:prstGeom prst="rect">
             <a:avLst/>
@@ -27703,7 +27825,7 @@
     </p:spTree>
     <p:extLst>
       <p:ext uri="{BB962C8B-B14F-4D97-AF65-F5344CB8AC3E}">
-        <p14:creationId xmlns:p14="http://schemas.microsoft.com/office/powerpoint/2010/main" val="3748472536"/>
+        <p14:creationId xmlns:p14="http://schemas.microsoft.com/office/powerpoint/2010/main" val="240174982"/>
       </p:ext>
     </p:extLst>
   </p:cSld>
@@ -27735,7 +27857,7 @@
           <p:cNvPr id="2" name="Title 1">
             <a:extLst>
               <a:ext uri="{FF2B5EF4-FFF2-40B4-BE49-F238E27FC236}">
-                <a16:creationId xmlns:a16="http://schemas.microsoft.com/office/drawing/2014/main" id="{734F6EA2-14BC-76D1-379F-525047DC6695}"/>
+                <a16:creationId xmlns:a16="http://schemas.microsoft.com/office/drawing/2014/main" id="{6559DECC-2000-3CD9-3EA1-DD3CF1A76BAC}"/>
               </a:ext>
             </a:extLst>
           </p:cNvPr>
@@ -27746,19 +27868,14 @@
             <p:ph type="title"/>
           </p:nvPr>
         </p:nvSpPr>
-        <p:spPr>
-          <a:xfrm>
-            <a:off x="611560" y="2641476"/>
-            <a:ext cx="8229600" cy="952501"/>
-          </a:xfrm>
-        </p:spPr>
+        <p:spPr/>
         <p:txBody>
           <a:bodyPr/>
           <a:lstStyle/>
           <a:p>
             <a:r>
               <a:rPr lang="en-GB" dirty="0"/>
-              <a:t>Review questions</a:t>
+              <a:t>Example -2</a:t>
             </a:r>
           </a:p>
         </p:txBody>
@@ -27768,7 +27885,7 @@
           <p:cNvPr id="3" name="Slide Number Placeholder 2">
             <a:extLst>
               <a:ext uri="{FF2B5EF4-FFF2-40B4-BE49-F238E27FC236}">
-                <a16:creationId xmlns:a16="http://schemas.microsoft.com/office/drawing/2014/main" id="{C6CCE4F5-FE1F-EFA2-7A2E-4EEC1B2D06B4}"/>
+                <a16:creationId xmlns:a16="http://schemas.microsoft.com/office/drawing/2014/main" id="{140944EA-A188-89FB-9F9D-2230006EF847}"/>
               </a:ext>
             </a:extLst>
           </p:cNvPr>
@@ -27793,10 +27910,46 @@
           </a:p>
         </p:txBody>
       </p:sp>
+      <p:pic>
+        <p:nvPicPr>
+          <p:cNvPr id="4" name="Picture 3" descr="Diagram&#10;&#10;Description automatically generated">
+            <a:extLst>
+              <a:ext uri="{FF2B5EF4-FFF2-40B4-BE49-F238E27FC236}">
+                <a16:creationId xmlns:a16="http://schemas.microsoft.com/office/drawing/2014/main" id="{BB3D4226-A77B-ED36-9701-4BDEA821D450}"/>
+              </a:ext>
+            </a:extLst>
+          </p:cNvPr>
+          <p:cNvPicPr>
+            <a:picLocks noChangeAspect="1"/>
+          </p:cNvPicPr>
+          <p:nvPr/>
+        </p:nvPicPr>
+        <p:blipFill>
+          <a:blip r:embed="rId2">
+            <a:extLst>
+              <a:ext uri="{28A0092B-C50C-407E-A947-70E740481C1C}">
+                <a14:useLocalDpi xmlns:a14="http://schemas.microsoft.com/office/drawing/2010/main" val="0"/>
+              </a:ext>
+            </a:extLst>
+          </a:blip>
+          <a:stretch>
+            <a:fillRect/>
+          </a:stretch>
+        </p:blipFill>
+        <p:spPr>
+          <a:xfrm>
+            <a:off x="884997" y="646002"/>
+            <a:ext cx="7772400" cy="4672124"/>
+          </a:xfrm>
+          <a:prstGeom prst="rect">
+            <a:avLst/>
+          </a:prstGeom>
+        </p:spPr>
+      </p:pic>
     </p:spTree>
     <p:extLst>
       <p:ext uri="{BB962C8B-B14F-4D97-AF65-F5344CB8AC3E}">
-        <p14:creationId xmlns:p14="http://schemas.microsoft.com/office/powerpoint/2010/main" val="433404740"/>
+        <p14:creationId xmlns:p14="http://schemas.microsoft.com/office/powerpoint/2010/main" val="3748472536"/>
       </p:ext>
     </p:extLst>
   </p:cSld>
@@ -27828,7 +27981,7 @@
           <p:cNvPr id="2" name="Title 1">
             <a:extLst>
               <a:ext uri="{FF2B5EF4-FFF2-40B4-BE49-F238E27FC236}">
-                <a16:creationId xmlns:a16="http://schemas.microsoft.com/office/drawing/2014/main" id="{8021B0F2-3821-CD3D-B330-CD4F2421D36A}"/>
+                <a16:creationId xmlns:a16="http://schemas.microsoft.com/office/drawing/2014/main" id="{734F6EA2-14BC-76D1-379F-525047DC6695}"/>
               </a:ext>
             </a:extLst>
           </p:cNvPr>
@@ -27839,52 +27992,29 @@
             <p:ph type="title"/>
           </p:nvPr>
         </p:nvSpPr>
-        <p:spPr/>
+        <p:spPr>
+          <a:xfrm>
+            <a:off x="683568" y="1904999"/>
+            <a:ext cx="8229600" cy="952501"/>
+          </a:xfrm>
+        </p:spPr>
         <p:txBody>
           <a:bodyPr/>
           <a:lstStyle/>
           <a:p>
             <a:r>
               <a:rPr lang="en-GB" dirty="0"/>
-              <a:t>Q1</a:t>
+              <a:t>Review questions</a:t>
             </a:r>
           </a:p>
         </p:txBody>
       </p:sp>
       <p:sp>
         <p:nvSpPr>
-          <p:cNvPr id="3" name="Content Placeholder 2">
-            <a:extLst>
-              <a:ext uri="{FF2B5EF4-FFF2-40B4-BE49-F238E27FC236}">
-                <a16:creationId xmlns:a16="http://schemas.microsoft.com/office/drawing/2014/main" id="{DCC699EC-FACD-9F52-BC28-40113A709968}"/>
-              </a:ext>
-            </a:extLst>
-          </p:cNvPr>
-          <p:cNvSpPr>
-            <a:spLocks noGrp="1"/>
-          </p:cNvSpPr>
-          <p:nvPr>
-            <p:ph idx="1"/>
-          </p:nvPr>
-        </p:nvSpPr>
-        <p:spPr/>
-        <p:txBody>
-          <a:bodyPr/>
-          <a:lstStyle/>
-          <a:p>
-            <a:r>
-              <a:rPr lang="en-GB" dirty="0"/>
-              <a:t>What could be the purpose of a NN architecture like this? </a:t>
-            </a:r>
-          </a:p>
-        </p:txBody>
-      </p:sp>
-      <p:sp>
-        <p:nvSpPr>
-          <p:cNvPr id="4" name="Slide Number Placeholder 3">
-            <a:extLst>
-              <a:ext uri="{FF2B5EF4-FFF2-40B4-BE49-F238E27FC236}">
-                <a16:creationId xmlns:a16="http://schemas.microsoft.com/office/drawing/2014/main" id="{76D314E9-EACD-0287-4107-3D552A2EEA66}"/>
+          <p:cNvPr id="3" name="Slide Number Placeholder 2">
+            <a:extLst>
+              <a:ext uri="{FF2B5EF4-FFF2-40B4-BE49-F238E27FC236}">
+                <a16:creationId xmlns:a16="http://schemas.microsoft.com/office/drawing/2014/main" id="{C6CCE4F5-FE1F-EFA2-7A2E-4EEC1B2D06B4}"/>
               </a:ext>
             </a:extLst>
           </p:cNvPr>
@@ -27900,7 +28030,7 @@
           <a:bodyPr/>
           <a:lstStyle/>
           <a:p>
-            <a:fld id="{44E22EE9-B8A0-0641-9265-052CFE9B95A7}" type="slidenum">
+            <a:fld id="{BB98F552-A29D-2D4E-8192-F20670493719}" type="slidenum">
               <a:rPr lang="en-GB" altLang="en-US" smtClean="0"/>
               <a:pPr/>
               <a:t>54</a:t>
@@ -27909,12 +28039,65 @@
           </a:p>
         </p:txBody>
       </p:sp>
+      <p:sp>
+        <p:nvSpPr>
+          <p:cNvPr id="4" name="TextBox 3">
+            <a:extLst>
+              <a:ext uri="{FF2B5EF4-FFF2-40B4-BE49-F238E27FC236}">
+                <a16:creationId xmlns:a16="http://schemas.microsoft.com/office/drawing/2014/main" id="{8314E32F-EC5E-BD2C-CA3D-3FA8B318C09D}"/>
+              </a:ext>
+            </a:extLst>
+          </p:cNvPr>
+          <p:cNvSpPr txBox="1"/>
+          <p:nvPr/>
+        </p:nvSpPr>
+        <p:spPr>
+          <a:xfrm>
+            <a:off x="683568" y="3903147"/>
+            <a:ext cx="2885085" cy="369332"/>
+          </a:xfrm>
+          <a:prstGeom prst="rect">
+            <a:avLst/>
+          </a:prstGeom>
+          <a:noFill/>
+        </p:spPr>
+        <p:txBody>
+          <a:bodyPr wrap="none" rtlCol="0">
+            <a:spAutoFit/>
+          </a:bodyPr>
+          <a:lstStyle/>
+          <a:p>
+            <a:r>
+              <a:rPr lang="en-GB" dirty="0" err="1">
+                <a:solidFill>
+                  <a:srgbClr val="003D7D"/>
+                </a:solidFill>
+                <a:latin typeface="Gill Sans MT" panose="020B0502020104020203" pitchFamily="34" charset="77"/>
+                <a:ea typeface="ＭＳ Ｐゴシック" charset="0"/>
+                <a:cs typeface="+mj-cs"/>
+              </a:rPr>
+              <a:t>Mentimeter</a:t>
+            </a:r>
+            <a:r>
+              <a:rPr lang="en-GB" dirty="0">
+                <a:solidFill>
+                  <a:srgbClr val="003D7D"/>
+                </a:solidFill>
+                <a:latin typeface="Gill Sans MT" panose="020B0502020104020203" pitchFamily="34" charset="77"/>
+                <a:ea typeface="ＭＳ Ｐゴシック" charset="0"/>
+                <a:cs typeface="+mj-cs"/>
+              </a:rPr>
+              <a:t> code: 5825 9955</a:t>
+            </a:r>
+          </a:p>
+        </p:txBody>
+      </p:sp>
       <p:pic>
         <p:nvPicPr>
-          <p:cNvPr id="8" name="Picture 7" descr="Diagram&#10;&#10;Description automatically generated">
-            <a:extLst>
-              <a:ext uri="{FF2B5EF4-FFF2-40B4-BE49-F238E27FC236}">
-                <a16:creationId xmlns:a16="http://schemas.microsoft.com/office/drawing/2014/main" id="{C97288C9-9E88-B6B0-F7F8-6C441D2B8B85}"/>
+          <p:cNvPr id="6" name="Picture 5" descr="Qr code&#10;&#10;Description automatically generated">
+            <a:extLst>
+              <a:ext uri="{FF2B5EF4-FFF2-40B4-BE49-F238E27FC236}">
+                <a16:creationId xmlns:a16="http://schemas.microsoft.com/office/drawing/2014/main" id="{52F5BE60-0106-7B0F-EA15-75070BC2AFB7}"/>
               </a:ext>
             </a:extLst>
           </p:cNvPr>
@@ -27937,8 +28120,8 @@
         </p:blipFill>
         <p:spPr>
           <a:xfrm>
-            <a:off x="611560" y="1417340"/>
-            <a:ext cx="7772400" cy="3139314"/>
+            <a:off x="5594994" y="1959098"/>
+            <a:ext cx="2698602" cy="2698602"/>
           </a:xfrm>
           <a:prstGeom prst="rect">
             <a:avLst/>
@@ -27948,7 +28131,7 @@
     </p:spTree>
     <p:extLst>
       <p:ext uri="{BB962C8B-B14F-4D97-AF65-F5344CB8AC3E}">
-        <p14:creationId xmlns:p14="http://schemas.microsoft.com/office/powerpoint/2010/main" val="4202234545"/>
+        <p14:creationId xmlns:p14="http://schemas.microsoft.com/office/powerpoint/2010/main" val="433404740"/>
       </p:ext>
     </p:extLst>
   </p:cSld>
@@ -27980,7 +28163,7 @@
           <p:cNvPr id="2" name="Title 1">
             <a:extLst>
               <a:ext uri="{FF2B5EF4-FFF2-40B4-BE49-F238E27FC236}">
-                <a16:creationId xmlns:a16="http://schemas.microsoft.com/office/drawing/2014/main" id="{814CF8EF-3CAD-00AF-7B8A-A1D562022048}"/>
+                <a16:creationId xmlns:a16="http://schemas.microsoft.com/office/drawing/2014/main" id="{8021B0F2-3821-CD3D-B330-CD4F2421D36A}"/>
               </a:ext>
             </a:extLst>
           </p:cNvPr>
@@ -27998,7 +28181,7 @@
           <a:p>
             <a:r>
               <a:rPr lang="en-GB" dirty="0"/>
-              <a:t>Q2</a:t>
+              <a:t>Q1</a:t>
             </a:r>
           </a:p>
         </p:txBody>
@@ -28008,7 +28191,7 @@
           <p:cNvPr id="3" name="Content Placeholder 2">
             <a:extLst>
               <a:ext uri="{FF2B5EF4-FFF2-40B4-BE49-F238E27FC236}">
-                <a16:creationId xmlns:a16="http://schemas.microsoft.com/office/drawing/2014/main" id="{FCF7E818-E523-E292-D896-F6A80494E7E2}"/>
+                <a16:creationId xmlns:a16="http://schemas.microsoft.com/office/drawing/2014/main" id="{DCC699EC-FACD-9F52-BC28-40113A709968}"/>
               </a:ext>
             </a:extLst>
           </p:cNvPr>
@@ -28026,35 +28209,7 @@
           <a:p>
             <a:r>
               <a:rPr lang="en-GB" dirty="0"/>
-              <a:t>Which of these will not improve the convergence of a neural networks model?</a:t>
-            </a:r>
-          </a:p>
-          <a:p>
-            <a:pPr lvl="1"/>
-            <a:r>
-              <a:rPr lang="en-GB" dirty="0"/>
-              <a:t>Adaptive learning rate</a:t>
-            </a:r>
-          </a:p>
-          <a:p>
-            <a:pPr lvl="1"/>
-            <a:r>
-              <a:rPr lang="en-GB" dirty="0"/>
-              <a:t>Data normalisation</a:t>
-            </a:r>
-          </a:p>
-          <a:p>
-            <a:pPr lvl="1"/>
-            <a:r>
-              <a:rPr lang="en-GB" dirty="0"/>
-              <a:t>Using an optimiser method</a:t>
-            </a:r>
-          </a:p>
-          <a:p>
-            <a:pPr lvl="1"/>
-            <a:r>
-              <a:rPr lang="en-GB" dirty="0"/>
-              <a:t>Initialising all the weights to zero (zero initialisation)</a:t>
+              <a:t>What could be the purpose of a NN architecture like this? </a:t>
             </a:r>
           </a:p>
         </p:txBody>
@@ -28064,7 +28219,7 @@
           <p:cNvPr id="4" name="Slide Number Placeholder 3">
             <a:extLst>
               <a:ext uri="{FF2B5EF4-FFF2-40B4-BE49-F238E27FC236}">
-                <a16:creationId xmlns:a16="http://schemas.microsoft.com/office/drawing/2014/main" id="{A0B2D7BF-80DB-160C-C9DE-D82E4E21E51E}"/>
+                <a16:creationId xmlns:a16="http://schemas.microsoft.com/office/drawing/2014/main" id="{76D314E9-EACD-0287-4107-3D552A2EEA66}"/>
               </a:ext>
             </a:extLst>
           </p:cNvPr>
@@ -28089,10 +28244,46 @@
           </a:p>
         </p:txBody>
       </p:sp>
+      <p:pic>
+        <p:nvPicPr>
+          <p:cNvPr id="8" name="Picture 7" descr="Diagram&#10;&#10;Description automatically generated">
+            <a:extLst>
+              <a:ext uri="{FF2B5EF4-FFF2-40B4-BE49-F238E27FC236}">
+                <a16:creationId xmlns:a16="http://schemas.microsoft.com/office/drawing/2014/main" id="{C97288C9-9E88-B6B0-F7F8-6C441D2B8B85}"/>
+              </a:ext>
+            </a:extLst>
+          </p:cNvPr>
+          <p:cNvPicPr>
+            <a:picLocks noChangeAspect="1"/>
+          </p:cNvPicPr>
+          <p:nvPr/>
+        </p:nvPicPr>
+        <p:blipFill>
+          <a:blip r:embed="rId2">
+            <a:extLst>
+              <a:ext uri="{28A0092B-C50C-407E-A947-70E740481C1C}">
+                <a14:useLocalDpi xmlns:a14="http://schemas.microsoft.com/office/drawing/2010/main" val="0"/>
+              </a:ext>
+            </a:extLst>
+          </a:blip>
+          <a:stretch>
+            <a:fillRect/>
+          </a:stretch>
+        </p:blipFill>
+        <p:spPr>
+          <a:xfrm>
+            <a:off x="611560" y="1417340"/>
+            <a:ext cx="7772400" cy="3139314"/>
+          </a:xfrm>
+          <a:prstGeom prst="rect">
+            <a:avLst/>
+          </a:prstGeom>
+        </p:spPr>
+      </p:pic>
     </p:spTree>
     <p:extLst>
       <p:ext uri="{BB962C8B-B14F-4D97-AF65-F5344CB8AC3E}">
-        <p14:creationId xmlns:p14="http://schemas.microsoft.com/office/powerpoint/2010/main" val="1779124528"/>
+        <p14:creationId xmlns:p14="http://schemas.microsoft.com/office/powerpoint/2010/main" val="4202234545"/>
       </p:ext>
     </p:extLst>
   </p:cSld>
@@ -28124,7 +28315,7 @@
           <p:cNvPr id="2" name="Title 1">
             <a:extLst>
               <a:ext uri="{FF2B5EF4-FFF2-40B4-BE49-F238E27FC236}">
-                <a16:creationId xmlns:a16="http://schemas.microsoft.com/office/drawing/2014/main" id="{6C947F4E-9B94-F5CB-203A-DCC969CCA43A}"/>
+                <a16:creationId xmlns:a16="http://schemas.microsoft.com/office/drawing/2014/main" id="{814CF8EF-3CAD-00AF-7B8A-A1D562022048}"/>
               </a:ext>
             </a:extLst>
           </p:cNvPr>
@@ -28142,7 +28333,7 @@
           <a:p>
             <a:r>
               <a:rPr lang="en-GB" dirty="0"/>
-              <a:t>Acknowledgments</a:t>
+              <a:t>Q2</a:t>
             </a:r>
           </a:p>
         </p:txBody>
@@ -28152,7 +28343,7 @@
           <p:cNvPr id="3" name="Content Placeholder 2">
             <a:extLst>
               <a:ext uri="{FF2B5EF4-FFF2-40B4-BE49-F238E27FC236}">
-                <a16:creationId xmlns:a16="http://schemas.microsoft.com/office/drawing/2014/main" id="{95878951-2515-EE74-D7C0-67A8C7FA66CC}"/>
+                <a16:creationId xmlns:a16="http://schemas.microsoft.com/office/drawing/2014/main" id="{FCF7E818-E523-E292-D896-F6A80494E7E2}"/>
               </a:ext>
             </a:extLst>
           </p:cNvPr>
@@ -28169,16 +28360,36 @@
           <a:lstStyle/>
           <a:p>
             <a:r>
-              <a:rPr lang="en-GB" sz="1800" dirty="0"/>
-              <a:t>Several slides are adapted from Dive into Deep Learning by Aston Zhang et al., https://d2l.ai/</a:t>
-            </a:r>
-            <a:r>
-              <a:rPr lang="en-GB" sz="1800" dirty="0" err="1"/>
-              <a:t>index.html</a:t>
-            </a:r>
-            <a:r>
-              <a:rPr lang="en-GB" sz="1800" dirty="0"/>
-              <a:t> </a:t>
+              <a:rPr lang="en-GB" dirty="0"/>
+              <a:t>Which of these will not improve the convergence of a neural networks model?</a:t>
+            </a:r>
+          </a:p>
+          <a:p>
+            <a:pPr lvl="1"/>
+            <a:r>
+              <a:rPr lang="en-GB" dirty="0"/>
+              <a:t>Adaptive learning rate</a:t>
+            </a:r>
+          </a:p>
+          <a:p>
+            <a:pPr lvl="1"/>
+            <a:r>
+              <a:rPr lang="en-GB" dirty="0"/>
+              <a:t>Data normalisation</a:t>
+            </a:r>
+          </a:p>
+          <a:p>
+            <a:pPr lvl="1"/>
+            <a:r>
+              <a:rPr lang="en-GB" dirty="0"/>
+              <a:t>Using an optimiser method</a:t>
+            </a:r>
+          </a:p>
+          <a:p>
+            <a:pPr lvl="1"/>
+            <a:r>
+              <a:rPr lang="en-GB" dirty="0"/>
+              <a:t>Initialising all the weights to zero (zero initialisation)</a:t>
             </a:r>
           </a:p>
         </p:txBody>
@@ -28188,7 +28399,7 @@
           <p:cNvPr id="4" name="Slide Number Placeholder 3">
             <a:extLst>
               <a:ext uri="{FF2B5EF4-FFF2-40B4-BE49-F238E27FC236}">
-                <a16:creationId xmlns:a16="http://schemas.microsoft.com/office/drawing/2014/main" id="{9168C321-C8FD-6B4F-73D6-4A04023A70E9}"/>
+                <a16:creationId xmlns:a16="http://schemas.microsoft.com/office/drawing/2014/main" id="{A0B2D7BF-80DB-160C-C9DE-D82E4E21E51E}"/>
               </a:ext>
             </a:extLst>
           </p:cNvPr>
@@ -28216,7 +28427,7 @@
     </p:spTree>
     <p:extLst>
       <p:ext uri="{BB962C8B-B14F-4D97-AF65-F5344CB8AC3E}">
-        <p14:creationId xmlns:p14="http://schemas.microsoft.com/office/powerpoint/2010/main" val="2653526672"/>
+        <p14:creationId xmlns:p14="http://schemas.microsoft.com/office/powerpoint/2010/main" val="1779124528"/>
       </p:ext>
     </p:extLst>
   </p:cSld>
@@ -28248,7 +28459,7 @@
           <p:cNvPr id="2" name="Title 1">
             <a:extLst>
               <a:ext uri="{FF2B5EF4-FFF2-40B4-BE49-F238E27FC236}">
-                <a16:creationId xmlns:a16="http://schemas.microsoft.com/office/drawing/2014/main" id="{4A0D4B0E-EC4B-AF65-F5A6-6C77B84E688D}"/>
+                <a16:creationId xmlns:a16="http://schemas.microsoft.com/office/drawing/2014/main" id="{6C947F4E-9B94-F5CB-203A-DCC969CCA43A}"/>
               </a:ext>
             </a:extLst>
           </p:cNvPr>
@@ -28265,8 +28476,8 @@
           <a:lstStyle/>
           <a:p>
             <a:r>
-              <a:rPr lang="en-US" dirty="0"/>
-              <a:t>If you have any questions </a:t>
+              <a:rPr lang="en-GB" dirty="0"/>
+              <a:t>Acknowledgments</a:t>
             </a:r>
           </a:p>
         </p:txBody>
@@ -28276,7 +28487,7 @@
           <p:cNvPr id="3" name="Content Placeholder 2">
             <a:extLst>
               <a:ext uri="{FF2B5EF4-FFF2-40B4-BE49-F238E27FC236}">
-                <a16:creationId xmlns:a16="http://schemas.microsoft.com/office/drawing/2014/main" id="{F37C2CD0-A4E6-0FCE-E04C-C1C1CB0C3E1D}"/>
+                <a16:creationId xmlns:a16="http://schemas.microsoft.com/office/drawing/2014/main" id="{95878951-2515-EE74-D7C0-67A8C7FA66CC}"/>
               </a:ext>
             </a:extLst>
           </p:cNvPr>
@@ -28293,20 +28504,17 @@
           <a:lstStyle/>
           <a:p>
             <a:r>
-              <a:rPr lang="en-US" dirty="0"/>
-              <a:t>Please feel free to come and see me (9</a:t>
-            </a:r>
-            <a:r>
-              <a:rPr lang="en-US" baseline="30000" dirty="0"/>
-              <a:t>th</a:t>
-            </a:r>
-            <a:r>
-              <a:rPr lang="en-US" dirty="0"/>
-              <a:t> Floor, Sir Michael Uren Research Hub, White City Campus) or email (p.barnaghi@imperial.ac.uk). </a:t>
-            </a:r>
-          </a:p>
-          <a:p>
-            <a:endParaRPr lang="en-US" dirty="0"/>
+              <a:rPr lang="en-GB" sz="1800" dirty="0"/>
+              <a:t>Several slides are adapted from Dive into Deep Learning by Aston Zhang et al., https://d2l.ai/</a:t>
+            </a:r>
+            <a:r>
+              <a:rPr lang="en-GB" sz="1800" dirty="0" err="1"/>
+              <a:t>index.html</a:t>
+            </a:r>
+            <a:r>
+              <a:rPr lang="en-GB" sz="1800" dirty="0"/>
+              <a:t> </a:t>
+            </a:r>
           </a:p>
         </p:txBody>
       </p:sp>
@@ -28315,7 +28523,7 @@
           <p:cNvPr id="4" name="Slide Number Placeholder 3">
             <a:extLst>
               <a:ext uri="{FF2B5EF4-FFF2-40B4-BE49-F238E27FC236}">
-                <a16:creationId xmlns:a16="http://schemas.microsoft.com/office/drawing/2014/main" id="{5871F661-CD16-4A1E-EAB3-76CFDCC66AF4}"/>
+                <a16:creationId xmlns:a16="http://schemas.microsoft.com/office/drawing/2014/main" id="{9168C321-C8FD-6B4F-73D6-4A04023A70E9}"/>
               </a:ext>
             </a:extLst>
           </p:cNvPr>
@@ -28343,7 +28551,7 @@
     </p:spTree>
     <p:extLst>
       <p:ext uri="{BB962C8B-B14F-4D97-AF65-F5344CB8AC3E}">
-        <p14:creationId xmlns:p14="http://schemas.microsoft.com/office/powerpoint/2010/main" val="339632004"/>
+        <p14:creationId xmlns:p14="http://schemas.microsoft.com/office/powerpoint/2010/main" val="2653526672"/>
       </p:ext>
     </p:extLst>
   </p:cSld>
@@ -28375,7 +28583,7 @@
           <p:cNvPr id="2" name="Title 1">
             <a:extLst>
               <a:ext uri="{FF2B5EF4-FFF2-40B4-BE49-F238E27FC236}">
-                <a16:creationId xmlns:a16="http://schemas.microsoft.com/office/drawing/2014/main" id="{D1054D05-FE96-EDFD-05C6-8D929E43D4D0}"/>
+                <a16:creationId xmlns:a16="http://schemas.microsoft.com/office/drawing/2014/main" id="{4A0D4B0E-EC4B-AF65-F5A6-6C77B84E688D}"/>
               </a:ext>
             </a:extLst>
           </p:cNvPr>
@@ -28386,20 +28594,54 @@
             <p:ph type="title"/>
           </p:nvPr>
         </p:nvSpPr>
-        <p:spPr>
-          <a:xfrm>
-            <a:off x="755576" y="2381249"/>
-            <a:ext cx="8229600" cy="952501"/>
-          </a:xfrm>
-        </p:spPr>
+        <p:spPr/>
         <p:txBody>
           <a:bodyPr/>
           <a:lstStyle/>
           <a:p>
             <a:r>
-              <a:rPr lang="en-GB" dirty="0"/>
-              <a:t>Further reading</a:t>
-            </a:r>
+              <a:rPr lang="en-US" dirty="0"/>
+              <a:t>If you have any questions </a:t>
+            </a:r>
+          </a:p>
+        </p:txBody>
+      </p:sp>
+      <p:sp>
+        <p:nvSpPr>
+          <p:cNvPr id="3" name="Content Placeholder 2">
+            <a:extLst>
+              <a:ext uri="{FF2B5EF4-FFF2-40B4-BE49-F238E27FC236}">
+                <a16:creationId xmlns:a16="http://schemas.microsoft.com/office/drawing/2014/main" id="{F37C2CD0-A4E6-0FCE-E04C-C1C1CB0C3E1D}"/>
+              </a:ext>
+            </a:extLst>
+          </p:cNvPr>
+          <p:cNvSpPr>
+            <a:spLocks noGrp="1"/>
+          </p:cNvSpPr>
+          <p:nvPr>
+            <p:ph idx="1"/>
+          </p:nvPr>
+        </p:nvSpPr>
+        <p:spPr/>
+        <p:txBody>
+          <a:bodyPr/>
+          <a:lstStyle/>
+          <a:p>
+            <a:r>
+              <a:rPr lang="en-US" dirty="0"/>
+              <a:t>Please feel free to come and see me (9</a:t>
+            </a:r>
+            <a:r>
+              <a:rPr lang="en-US" baseline="30000" dirty="0"/>
+              <a:t>th</a:t>
+            </a:r>
+            <a:r>
+              <a:rPr lang="en-US" dirty="0"/>
+              <a:t> Floor, Sir Michael Uren Research Hub, White City Campus) or email (p.barnaghi@imperial.ac.uk). </a:t>
+            </a:r>
+          </a:p>
+          <a:p>
+            <a:endParaRPr lang="en-US" dirty="0"/>
           </a:p>
         </p:txBody>
       </p:sp>
@@ -28408,7 +28650,7 @@
           <p:cNvPr id="4" name="Slide Number Placeholder 3">
             <a:extLst>
               <a:ext uri="{FF2B5EF4-FFF2-40B4-BE49-F238E27FC236}">
-                <a16:creationId xmlns:a16="http://schemas.microsoft.com/office/drawing/2014/main" id="{82F2CBC6-DBC3-1E50-C147-F67DB2215EEE}"/>
+                <a16:creationId xmlns:a16="http://schemas.microsoft.com/office/drawing/2014/main" id="{5871F661-CD16-4A1E-EAB3-76CFDCC66AF4}"/>
               </a:ext>
             </a:extLst>
           </p:cNvPr>
@@ -28436,7 +28678,7 @@
     </p:spTree>
     <p:extLst>
       <p:ext uri="{BB962C8B-B14F-4D97-AF65-F5344CB8AC3E}">
-        <p14:creationId xmlns:p14="http://schemas.microsoft.com/office/powerpoint/2010/main" val="2198604453"/>
+        <p14:creationId xmlns:p14="http://schemas.microsoft.com/office/powerpoint/2010/main" val="339632004"/>
       </p:ext>
     </p:extLst>
   </p:cSld>
@@ -28468,7 +28710,7 @@
           <p:cNvPr id="2" name="Title 1">
             <a:extLst>
               <a:ext uri="{FF2B5EF4-FFF2-40B4-BE49-F238E27FC236}">
-                <a16:creationId xmlns:a16="http://schemas.microsoft.com/office/drawing/2014/main" id="{7A60B60A-A8A4-F82E-F90F-372A336B8946}"/>
+                <a16:creationId xmlns:a16="http://schemas.microsoft.com/office/drawing/2014/main" id="{D1054D05-FE96-EDFD-05C6-8D929E43D4D0}"/>
               </a:ext>
             </a:extLst>
           </p:cNvPr>
@@ -28479,14 +28721,19 @@
             <p:ph type="title"/>
           </p:nvPr>
         </p:nvSpPr>
-        <p:spPr/>
+        <p:spPr>
+          <a:xfrm>
+            <a:off x="755576" y="2381249"/>
+            <a:ext cx="8229600" cy="952501"/>
+          </a:xfrm>
+        </p:spPr>
         <p:txBody>
           <a:bodyPr/>
           <a:lstStyle/>
           <a:p>
             <a:r>
               <a:rPr lang="en-GB" dirty="0"/>
-              <a:t>Derivative of Sigmoid function</a:t>
+              <a:t>Further reading</a:t>
             </a:r>
           </a:p>
         </p:txBody>
@@ -28496,7 +28743,7 @@
           <p:cNvPr id="4" name="Slide Number Placeholder 3">
             <a:extLst>
               <a:ext uri="{FF2B5EF4-FFF2-40B4-BE49-F238E27FC236}">
-                <a16:creationId xmlns:a16="http://schemas.microsoft.com/office/drawing/2014/main" id="{EE507A28-C1D7-A6F3-E2B4-F772C30EB44B}"/>
+                <a16:creationId xmlns:a16="http://schemas.microsoft.com/office/drawing/2014/main" id="{82F2CBC6-DBC3-1E50-C147-F67DB2215EEE}"/>
               </a:ext>
             </a:extLst>
           </p:cNvPr>
@@ -28521,82 +28768,10 @@
           </a:p>
         </p:txBody>
       </p:sp>
-      <p:pic>
-        <p:nvPicPr>
-          <p:cNvPr id="6" name="Picture 5" descr="Text&#10;&#10;Description automatically generated with medium confidence">
-            <a:extLst>
-              <a:ext uri="{FF2B5EF4-FFF2-40B4-BE49-F238E27FC236}">
-                <a16:creationId xmlns:a16="http://schemas.microsoft.com/office/drawing/2014/main" id="{63708E42-7032-E8EC-9C1A-B0D75EA138FC}"/>
-              </a:ext>
-            </a:extLst>
-          </p:cNvPr>
-          <p:cNvPicPr>
-            <a:picLocks noChangeAspect="1"/>
-          </p:cNvPicPr>
-          <p:nvPr/>
-        </p:nvPicPr>
-        <p:blipFill>
-          <a:blip r:embed="rId2">
-            <a:extLst>
-              <a:ext uri="{28A0092B-C50C-407E-A947-70E740481C1C}">
-                <a14:useLocalDpi xmlns:a14="http://schemas.microsoft.com/office/drawing/2010/main" val="0"/>
-              </a:ext>
-            </a:extLst>
-          </a:blip>
-          <a:stretch>
-            <a:fillRect/>
-          </a:stretch>
-        </p:blipFill>
-        <p:spPr>
-          <a:xfrm>
-            <a:off x="990600" y="3073524"/>
-            <a:ext cx="7162800" cy="939800"/>
-          </a:xfrm>
-          <a:prstGeom prst="rect">
-            <a:avLst/>
-          </a:prstGeom>
-        </p:spPr>
-      </p:pic>
-      <p:pic>
-        <p:nvPicPr>
-          <p:cNvPr id="8" name="Picture 7" descr="Diagram&#10;&#10;Description automatically generated">
-            <a:extLst>
-              <a:ext uri="{FF2B5EF4-FFF2-40B4-BE49-F238E27FC236}">
-                <a16:creationId xmlns:a16="http://schemas.microsoft.com/office/drawing/2014/main" id="{6AAFA948-A7FD-41D9-C08F-A0EE91CFD737}"/>
-              </a:ext>
-            </a:extLst>
-          </p:cNvPr>
-          <p:cNvPicPr>
-            <a:picLocks noChangeAspect="1"/>
-          </p:cNvPicPr>
-          <p:nvPr/>
-        </p:nvPicPr>
-        <p:blipFill>
-          <a:blip r:embed="rId3">
-            <a:extLst>
-              <a:ext uri="{28A0092B-C50C-407E-A947-70E740481C1C}">
-                <a14:useLocalDpi xmlns:a14="http://schemas.microsoft.com/office/drawing/2010/main" val="0"/>
-              </a:ext>
-            </a:extLst>
-          </a:blip>
-          <a:stretch>
-            <a:fillRect/>
-          </a:stretch>
-        </p:blipFill>
-        <p:spPr>
-          <a:xfrm>
-            <a:off x="990600" y="2216026"/>
-            <a:ext cx="3251200" cy="850900"/>
-          </a:xfrm>
-          <a:prstGeom prst="rect">
-            <a:avLst/>
-          </a:prstGeom>
-        </p:spPr>
-      </p:pic>
     </p:spTree>
     <p:extLst>
       <p:ext uri="{BB962C8B-B14F-4D97-AF65-F5344CB8AC3E}">
-        <p14:creationId xmlns:p14="http://schemas.microsoft.com/office/powerpoint/2010/main" val="1071395646"/>
+        <p14:creationId xmlns:p14="http://schemas.microsoft.com/office/powerpoint/2010/main" val="2198604453"/>
       </p:ext>
     </p:extLst>
   </p:cSld>
@@ -30194,6 +30369,594 @@
     <p:extLst>
       <p:ext uri="{BB962C8B-B14F-4D97-AF65-F5344CB8AC3E}">
         <p14:creationId xmlns:p14="http://schemas.microsoft.com/office/powerpoint/2010/main" val="1841939963"/>
+      </p:ext>
+    </p:extLst>
+  </p:cSld>
+  <p:clrMapOvr>
+    <a:masterClrMapping/>
+  </p:clrMapOvr>
+</p:sld>
+</file>
+
+<file path=ppt/slides/slide60.xml><?xml version="1.0" encoding="utf-8"?>
+<p:sld xmlns:a="http://schemas.openxmlformats.org/drawingml/2006/main" xmlns:r="http://schemas.openxmlformats.org/officeDocument/2006/relationships" xmlns:p="http://schemas.openxmlformats.org/presentationml/2006/main">
+  <p:cSld>
+    <p:spTree>
+      <p:nvGrpSpPr>
+        <p:cNvPr id="1" name=""/>
+        <p:cNvGrpSpPr/>
+        <p:nvPr/>
+      </p:nvGrpSpPr>
+      <p:grpSpPr>
+        <a:xfrm>
+          <a:off x="0" y="0"/>
+          <a:ext cx="0" cy="0"/>
+          <a:chOff x="0" y="0"/>
+          <a:chExt cx="0" cy="0"/>
+        </a:xfrm>
+      </p:grpSpPr>
+      <p:sp>
+        <p:nvSpPr>
+          <p:cNvPr id="2" name="Title 1">
+            <a:extLst>
+              <a:ext uri="{FF2B5EF4-FFF2-40B4-BE49-F238E27FC236}">
+                <a16:creationId xmlns:a16="http://schemas.microsoft.com/office/drawing/2014/main" id="{7A60B60A-A8A4-F82E-F90F-372A336B8946}"/>
+              </a:ext>
+            </a:extLst>
+          </p:cNvPr>
+          <p:cNvSpPr>
+            <a:spLocks noGrp="1"/>
+          </p:cNvSpPr>
+          <p:nvPr>
+            <p:ph type="title"/>
+          </p:nvPr>
+        </p:nvSpPr>
+        <p:spPr/>
+        <p:txBody>
+          <a:bodyPr/>
+          <a:lstStyle/>
+          <a:p>
+            <a:r>
+              <a:rPr lang="en-GB" dirty="0"/>
+              <a:t>Derivative of Sigmoid function</a:t>
+            </a:r>
+          </a:p>
+        </p:txBody>
+      </p:sp>
+      <p:sp>
+        <p:nvSpPr>
+          <p:cNvPr id="4" name="Slide Number Placeholder 3">
+            <a:extLst>
+              <a:ext uri="{FF2B5EF4-FFF2-40B4-BE49-F238E27FC236}">
+                <a16:creationId xmlns:a16="http://schemas.microsoft.com/office/drawing/2014/main" id="{EE507A28-C1D7-A6F3-E2B4-F772C30EB44B}"/>
+              </a:ext>
+            </a:extLst>
+          </p:cNvPr>
+          <p:cNvSpPr>
+            <a:spLocks noGrp="1"/>
+          </p:cNvSpPr>
+          <p:nvPr>
+            <p:ph type="sldNum" sz="quarter" idx="12"/>
+          </p:nvPr>
+        </p:nvSpPr>
+        <p:spPr/>
+        <p:txBody>
+          <a:bodyPr/>
+          <a:lstStyle/>
+          <a:p>
+            <a:fld id="{44E22EE9-B8A0-0641-9265-052CFE9B95A7}" type="slidenum">
+              <a:rPr lang="en-GB" altLang="en-US" smtClean="0"/>
+              <a:pPr/>
+              <a:t>60</a:t>
+            </a:fld>
+            <a:endParaRPr lang="en-GB" altLang="en-US" dirty="0"/>
+          </a:p>
+        </p:txBody>
+      </p:sp>
+      <p:pic>
+        <p:nvPicPr>
+          <p:cNvPr id="6" name="Picture 5" descr="Text&#10;&#10;Description automatically generated with medium confidence">
+            <a:extLst>
+              <a:ext uri="{FF2B5EF4-FFF2-40B4-BE49-F238E27FC236}">
+                <a16:creationId xmlns:a16="http://schemas.microsoft.com/office/drawing/2014/main" id="{63708E42-7032-E8EC-9C1A-B0D75EA138FC}"/>
+              </a:ext>
+            </a:extLst>
+          </p:cNvPr>
+          <p:cNvPicPr>
+            <a:picLocks noChangeAspect="1"/>
+          </p:cNvPicPr>
+          <p:nvPr/>
+        </p:nvPicPr>
+        <p:blipFill>
+          <a:blip r:embed="rId2">
+            <a:extLst>
+              <a:ext uri="{28A0092B-C50C-407E-A947-70E740481C1C}">
+                <a14:useLocalDpi xmlns:a14="http://schemas.microsoft.com/office/drawing/2010/main" val="0"/>
+              </a:ext>
+            </a:extLst>
+          </a:blip>
+          <a:stretch>
+            <a:fillRect/>
+          </a:stretch>
+        </p:blipFill>
+        <p:spPr>
+          <a:xfrm>
+            <a:off x="990600" y="3073524"/>
+            <a:ext cx="7162800" cy="939800"/>
+          </a:xfrm>
+          <a:prstGeom prst="rect">
+            <a:avLst/>
+          </a:prstGeom>
+        </p:spPr>
+      </p:pic>
+      <p:pic>
+        <p:nvPicPr>
+          <p:cNvPr id="8" name="Picture 7" descr="Diagram&#10;&#10;Description automatically generated">
+            <a:extLst>
+              <a:ext uri="{FF2B5EF4-FFF2-40B4-BE49-F238E27FC236}">
+                <a16:creationId xmlns:a16="http://schemas.microsoft.com/office/drawing/2014/main" id="{6AAFA948-A7FD-41D9-C08F-A0EE91CFD737}"/>
+              </a:ext>
+            </a:extLst>
+          </p:cNvPr>
+          <p:cNvPicPr>
+            <a:picLocks noChangeAspect="1"/>
+          </p:cNvPicPr>
+          <p:nvPr/>
+        </p:nvPicPr>
+        <p:blipFill>
+          <a:blip r:embed="rId3">
+            <a:extLst>
+              <a:ext uri="{28A0092B-C50C-407E-A947-70E740481C1C}">
+                <a14:useLocalDpi xmlns:a14="http://schemas.microsoft.com/office/drawing/2010/main" val="0"/>
+              </a:ext>
+            </a:extLst>
+          </a:blip>
+          <a:stretch>
+            <a:fillRect/>
+          </a:stretch>
+        </p:blipFill>
+        <p:spPr>
+          <a:xfrm>
+            <a:off x="990600" y="2216026"/>
+            <a:ext cx="3251200" cy="850900"/>
+          </a:xfrm>
+          <a:prstGeom prst="rect">
+            <a:avLst/>
+          </a:prstGeom>
+        </p:spPr>
+      </p:pic>
+    </p:spTree>
+    <p:extLst>
+      <p:ext uri="{BB962C8B-B14F-4D97-AF65-F5344CB8AC3E}">
+        <p14:creationId xmlns:p14="http://schemas.microsoft.com/office/powerpoint/2010/main" val="1071395646"/>
+      </p:ext>
+    </p:extLst>
+  </p:cSld>
+  <p:clrMapOvr>
+    <a:masterClrMapping/>
+  </p:clrMapOvr>
+</p:sld>
+</file>
+
+<file path=ppt/slides/slide61.xml><?xml version="1.0" encoding="utf-8"?>
+<p:sld xmlns:a="http://schemas.openxmlformats.org/drawingml/2006/main" xmlns:r="http://schemas.openxmlformats.org/officeDocument/2006/relationships" xmlns:p="http://schemas.openxmlformats.org/presentationml/2006/main">
+  <p:cSld>
+    <p:spTree>
+      <p:nvGrpSpPr>
+        <p:cNvPr id="1" name=""/>
+        <p:cNvGrpSpPr/>
+        <p:nvPr/>
+      </p:nvGrpSpPr>
+      <p:grpSpPr>
+        <a:xfrm>
+          <a:off x="0" y="0"/>
+          <a:ext cx="0" cy="0"/>
+          <a:chOff x="0" y="0"/>
+          <a:chExt cx="0" cy="0"/>
+        </a:xfrm>
+      </p:grpSpPr>
+      <p:sp>
+        <p:nvSpPr>
+          <p:cNvPr id="2" name="Title 1">
+            <a:extLst>
+              <a:ext uri="{FF2B5EF4-FFF2-40B4-BE49-F238E27FC236}">
+                <a16:creationId xmlns:a16="http://schemas.microsoft.com/office/drawing/2014/main" id="{7489F18F-A11E-FE9E-0CF1-8B12DD5420D7}"/>
+              </a:ext>
+            </a:extLst>
+          </p:cNvPr>
+          <p:cNvSpPr>
+            <a:spLocks noGrp="1"/>
+          </p:cNvSpPr>
+          <p:nvPr>
+            <p:ph type="title"/>
+          </p:nvPr>
+        </p:nvSpPr>
+        <p:spPr/>
+        <p:txBody>
+          <a:bodyPr/>
+          <a:lstStyle/>
+          <a:p>
+            <a:r>
+              <a:rPr lang="en-GB" dirty="0"/>
+              <a:t>Gradient of </a:t>
+            </a:r>
+            <a:r>
+              <a:rPr lang="en-GB" dirty="0" err="1"/>
+              <a:t>ReLU</a:t>
+            </a:r>
+            <a:endParaRPr lang="en-GB" dirty="0"/>
+          </a:p>
+        </p:txBody>
+      </p:sp>
+      <p:sp>
+        <p:nvSpPr>
+          <p:cNvPr id="3" name="Slide Number Placeholder 2">
+            <a:extLst>
+              <a:ext uri="{FF2B5EF4-FFF2-40B4-BE49-F238E27FC236}">
+                <a16:creationId xmlns:a16="http://schemas.microsoft.com/office/drawing/2014/main" id="{DAEBE678-EA12-C153-6C91-C7B7C3909631}"/>
+              </a:ext>
+            </a:extLst>
+          </p:cNvPr>
+          <p:cNvSpPr>
+            <a:spLocks noGrp="1"/>
+          </p:cNvSpPr>
+          <p:nvPr>
+            <p:ph type="sldNum" sz="quarter" idx="12"/>
+          </p:nvPr>
+        </p:nvSpPr>
+        <p:spPr/>
+        <p:txBody>
+          <a:bodyPr/>
+          <a:lstStyle/>
+          <a:p>
+            <a:fld id="{BB98F552-A29D-2D4E-8192-F20670493719}" type="slidenum">
+              <a:rPr lang="en-GB" altLang="en-US" smtClean="0"/>
+              <a:pPr/>
+              <a:t>61</a:t>
+            </a:fld>
+            <a:endParaRPr lang="en-GB" altLang="en-US" dirty="0"/>
+          </a:p>
+        </p:txBody>
+      </p:sp>
+      <mc:AlternateContent xmlns:mc="http://schemas.openxmlformats.org/markup-compatibility/2006" xmlns:a14="http://schemas.microsoft.com/office/drawing/2010/main">
+        <mc:Choice Requires="a14">
+          <p:sp>
+            <p:nvSpPr>
+              <p:cNvPr id="4" name="TextBox 3">
+                <a:extLst>
+                  <a:ext uri="{FF2B5EF4-FFF2-40B4-BE49-F238E27FC236}">
+                    <a16:creationId xmlns:a16="http://schemas.microsoft.com/office/drawing/2014/main" id="{E7FF3238-89B7-5D4C-4A85-20C5E4A7D1FD}"/>
+                  </a:ext>
+                </a:extLst>
+              </p:cNvPr>
+              <p:cNvSpPr txBox="1"/>
+              <p:nvPr/>
+            </p:nvSpPr>
+            <p:spPr>
+              <a:xfrm>
+                <a:off x="816165" y="1417340"/>
+                <a:ext cx="5107424" cy="710194"/>
+              </a:xfrm>
+              <a:prstGeom prst="rect">
+                <a:avLst/>
+              </a:prstGeom>
+              <a:noFill/>
+            </p:spPr>
+            <p:txBody>
+              <a:bodyPr wrap="none" rtlCol="0">
+                <a:spAutoFit/>
+              </a:bodyPr>
+              <a:lstStyle/>
+              <a:p>
+                <a:pPr/>
+                <a14:m>
+                  <m:oMathPara xmlns:m="http://schemas.openxmlformats.org/officeDocument/2006/math">
+                    <m:oMathParaPr>
+                      <m:jc m:val="centerGroup"/>
+                    </m:oMathParaPr>
+                    <m:oMath xmlns:m="http://schemas.openxmlformats.org/officeDocument/2006/math">
+                      <m:r>
+                        <a:rPr lang="en-GB" b="0" i="1" smtClean="0">
+                          <a:latin typeface="Cambria Math" panose="02040503050406030204" pitchFamily="18" charset="0"/>
+                        </a:rPr>
+                        <m:t>𝑔𝑟𝑎𝑑𝑖𝑒𝑛𝑡</m:t>
+                      </m:r>
+                      <m:r>
+                        <a:rPr lang="en-GB" b="0" i="1" smtClean="0">
+                          <a:latin typeface="Cambria Math" panose="02040503050406030204" pitchFamily="18" charset="0"/>
+                        </a:rPr>
+                        <m:t> </m:t>
+                      </m:r>
+                      <m:r>
+                        <a:rPr lang="en-GB" b="0" i="1" smtClean="0">
+                          <a:latin typeface="Cambria Math" panose="02040503050406030204" pitchFamily="18" charset="0"/>
+                        </a:rPr>
+                        <m:t>𝑜𝑓</m:t>
+                      </m:r>
+                      <m:r>
+                        <a:rPr lang="en-GB" b="0" i="1" smtClean="0">
+                          <a:latin typeface="Cambria Math" panose="02040503050406030204" pitchFamily="18" charset="0"/>
+                        </a:rPr>
+                        <m:t> </m:t>
+                      </m:r>
+                      <m:r>
+                        <a:rPr lang="en-GB" b="0" i="1" smtClean="0">
+                          <a:latin typeface="Cambria Math" panose="02040503050406030204" pitchFamily="18" charset="0"/>
+                        </a:rPr>
+                        <m:t>𝑅𝑒𝐿𝑈</m:t>
+                      </m:r>
+                      <m:r>
+                        <a:rPr lang="en-GB" b="0" i="1" smtClean="0">
+                          <a:latin typeface="Cambria Math" panose="02040503050406030204" pitchFamily="18" charset="0"/>
+                        </a:rPr>
+                        <m:t>=</m:t>
+                      </m:r>
+                      <m:f>
+                        <m:fPr>
+                          <m:ctrlPr>
+                            <a:rPr lang="en-GB" b="0" i="1" smtClean="0">
+                              <a:latin typeface="Cambria Math" panose="02040503050406030204" pitchFamily="18" charset="0"/>
+                            </a:rPr>
+                          </m:ctrlPr>
+                        </m:fPr>
+                        <m:num>
+                          <m:r>
+                            <a:rPr lang="en-GB" b="0" i="1" smtClean="0">
+                              <a:latin typeface="Cambria Math" panose="02040503050406030204" pitchFamily="18" charset="0"/>
+                            </a:rPr>
+                            <m:t>𝜕</m:t>
+                          </m:r>
+                          <m:r>
+                            <a:rPr lang="en-GB" b="0" i="1" smtClean="0">
+                              <a:latin typeface="Cambria Math" panose="02040503050406030204" pitchFamily="18" charset="0"/>
+                            </a:rPr>
+                            <m:t>𝑅𝑒𝐿𝑈</m:t>
+                          </m:r>
+                          <m:r>
+                            <a:rPr lang="en-GB" b="0" i="1" smtClean="0">
+                              <a:latin typeface="Cambria Math" panose="02040503050406030204" pitchFamily="18" charset="0"/>
+                            </a:rPr>
+                            <m:t>(</m:t>
+                          </m:r>
+                          <m:r>
+                            <a:rPr lang="en-GB" b="0" i="1" smtClean="0">
+                              <a:latin typeface="Cambria Math" panose="02040503050406030204" pitchFamily="18" charset="0"/>
+                            </a:rPr>
+                            <m:t>𝑥</m:t>
+                          </m:r>
+                          <m:r>
+                            <a:rPr lang="en-GB" b="0" i="1" smtClean="0">
+                              <a:latin typeface="Cambria Math" panose="02040503050406030204" pitchFamily="18" charset="0"/>
+                            </a:rPr>
+                            <m:t>)</m:t>
+                          </m:r>
+                        </m:num>
+                        <m:den>
+                          <m:r>
+                            <a:rPr lang="en-GB" b="0" i="1" smtClean="0">
+                              <a:latin typeface="Cambria Math" panose="02040503050406030204" pitchFamily="18" charset="0"/>
+                            </a:rPr>
+                            <m:t>𝜕</m:t>
+                          </m:r>
+                          <m:r>
+                            <a:rPr lang="en-GB" b="0" i="1" smtClean="0">
+                              <a:latin typeface="Cambria Math" panose="02040503050406030204" pitchFamily="18" charset="0"/>
+                            </a:rPr>
+                            <m:t>𝑥</m:t>
+                          </m:r>
+                        </m:den>
+                      </m:f>
+                      <m:r>
+                        <a:rPr lang="en-GB" b="0" i="1" smtClean="0">
+                          <a:latin typeface="Cambria Math" panose="02040503050406030204" pitchFamily="18" charset="0"/>
+                        </a:rPr>
+                        <m:t>=  </m:t>
+                      </m:r>
+                      <m:d>
+                        <m:dPr>
+                          <m:begChr m:val="{"/>
+                          <m:endChr m:val=""/>
+                          <m:ctrlPr>
+                            <a:rPr lang="en-GB" b="0" i="1" smtClean="0">
+                              <a:latin typeface="Cambria Math" panose="02040503050406030204" pitchFamily="18" charset="0"/>
+                            </a:rPr>
+                          </m:ctrlPr>
+                        </m:dPr>
+                        <m:e>
+                          <m:eqArr>
+                            <m:eqArrPr>
+                              <m:ctrlPr>
+                                <a:rPr lang="en-GB" b="0" i="1" smtClean="0">
+                                  <a:latin typeface="Cambria Math" panose="02040503050406030204" pitchFamily="18" charset="0"/>
+                                </a:rPr>
+                              </m:ctrlPr>
+                            </m:eqArrPr>
+                            <m:e>
+                              <m:r>
+                                <a:rPr lang="en-GB" b="0" i="1" smtClean="0">
+                                  <a:latin typeface="Cambria Math" panose="02040503050406030204" pitchFamily="18" charset="0"/>
+                                </a:rPr>
+                                <m:t>0     </m:t>
+                              </m:r>
+                              <m:r>
+                                <a:rPr lang="en-GB" b="0" i="1" smtClean="0">
+                                  <a:latin typeface="Cambria Math" panose="02040503050406030204" pitchFamily="18" charset="0"/>
+                                </a:rPr>
+                                <m:t>𝑖𝑓</m:t>
+                              </m:r>
+                              <m:r>
+                                <a:rPr lang="en-GB" b="0" i="1" smtClean="0">
+                                  <a:latin typeface="Cambria Math" panose="02040503050406030204" pitchFamily="18" charset="0"/>
+                                </a:rPr>
+                                <m:t> </m:t>
+                              </m:r>
+                              <m:r>
+                                <a:rPr lang="en-GB" b="0" i="1" smtClean="0">
+                                  <a:latin typeface="Cambria Math" panose="02040503050406030204" pitchFamily="18" charset="0"/>
+                                </a:rPr>
+                                <m:t>𝑥</m:t>
+                              </m:r>
+                              <m:r>
+                                <a:rPr lang="en-GB" b="0" i="1" smtClean="0">
+                                  <a:latin typeface="Cambria Math" panose="02040503050406030204" pitchFamily="18" charset="0"/>
+                                </a:rPr>
+                                <m:t>&lt;0</m:t>
+                              </m:r>
+                            </m:e>
+                            <m:e>
+                              <m:r>
+                                <a:rPr lang="en-GB" b="0" i="1" smtClean="0">
+                                  <a:latin typeface="Cambria Math" panose="02040503050406030204" pitchFamily="18" charset="0"/>
+                                </a:rPr>
+                                <m:t>1    </m:t>
+                              </m:r>
+                              <m:r>
+                                <a:rPr lang="en-GB" b="0" i="1" smtClean="0">
+                                  <a:latin typeface="Cambria Math" panose="02040503050406030204" pitchFamily="18" charset="0"/>
+                                </a:rPr>
+                                <m:t>𝑖𝑓</m:t>
+                              </m:r>
+                              <m:r>
+                                <a:rPr lang="en-GB" b="0" i="1" smtClean="0">
+                                  <a:latin typeface="Cambria Math" panose="02040503050406030204" pitchFamily="18" charset="0"/>
+                                </a:rPr>
+                                <m:t> </m:t>
+                              </m:r>
+                              <m:r>
+                                <a:rPr lang="en-GB" b="0" i="1" smtClean="0">
+                                  <a:latin typeface="Cambria Math" panose="02040503050406030204" pitchFamily="18" charset="0"/>
+                                </a:rPr>
+                                <m:t>𝑥</m:t>
+                              </m:r>
+                              <m:r>
+                                <a:rPr lang="en-GB" b="0" i="1" smtClean="0">
+                                  <a:latin typeface="Cambria Math" panose="02040503050406030204" pitchFamily="18" charset="0"/>
+                                </a:rPr>
+                                <m:t>&gt;0 </m:t>
+                              </m:r>
+                            </m:e>
+                          </m:eqArr>
+                        </m:e>
+                      </m:d>
+                    </m:oMath>
+                  </m:oMathPara>
+                </a14:m>
+                <a:endParaRPr lang="en-GB" dirty="0"/>
+              </a:p>
+            </p:txBody>
+          </p:sp>
+        </mc:Choice>
+        <mc:Fallback xmlns="">
+          <p:sp>
+            <p:nvSpPr>
+              <p:cNvPr id="4" name="TextBox 3">
+                <a:extLst>
+                  <a:ext uri="{FF2B5EF4-FFF2-40B4-BE49-F238E27FC236}">
+                    <a16:creationId xmlns:a16="http://schemas.microsoft.com/office/drawing/2014/main" id="{E7FF3238-89B7-5D4C-4A85-20C5E4A7D1FD}"/>
+                  </a:ext>
+                </a:extLst>
+              </p:cNvPr>
+              <p:cNvSpPr txBox="1">
+                <a:spLocks noRot="1" noChangeAspect="1" noMove="1" noResize="1" noEditPoints="1" noAdjustHandles="1" noChangeArrowheads="1" noChangeShapeType="1" noTextEdit="1"/>
+              </p:cNvSpPr>
+              <p:nvPr/>
+            </p:nvSpPr>
+            <p:spPr>
+              <a:xfrm>
+                <a:off x="816165" y="1417340"/>
+                <a:ext cx="5107424" cy="710194"/>
+              </a:xfrm>
+              <a:prstGeom prst="rect">
+                <a:avLst/>
+              </a:prstGeom>
+              <a:blipFill>
+                <a:blip r:embed="rId2"/>
+                <a:stretch>
+                  <a:fillRect t="-191228" b="-277193"/>
+                </a:stretch>
+              </a:blipFill>
+            </p:spPr>
+            <p:txBody>
+              <a:bodyPr/>
+              <a:lstStyle/>
+              <a:p>
+                <a:r>
+                  <a:rPr lang="en-GB">
+                    <a:noFill/>
+                  </a:rPr>
+                  <a:t> </a:t>
+                </a:r>
+              </a:p>
+            </p:txBody>
+          </p:sp>
+        </mc:Fallback>
+      </mc:AlternateContent>
+      <p:sp>
+        <p:nvSpPr>
+          <p:cNvPr id="5" name="TextBox 4">
+            <a:extLst>
+              <a:ext uri="{FF2B5EF4-FFF2-40B4-BE49-F238E27FC236}">
+                <a16:creationId xmlns:a16="http://schemas.microsoft.com/office/drawing/2014/main" id="{262ACACA-2A9A-76B4-8B1E-58E60550B044}"/>
+              </a:ext>
+            </a:extLst>
+          </p:cNvPr>
+          <p:cNvSpPr txBox="1"/>
+          <p:nvPr/>
+        </p:nvSpPr>
+        <p:spPr>
+          <a:xfrm>
+            <a:off x="792358" y="2766350"/>
+            <a:ext cx="7597824" cy="1323439"/>
+          </a:xfrm>
+          <a:prstGeom prst="rect">
+            <a:avLst/>
+          </a:prstGeom>
+          <a:noFill/>
+        </p:spPr>
+        <p:txBody>
+          <a:bodyPr wrap="square" rtlCol="0">
+            <a:spAutoFit/>
+          </a:bodyPr>
+          <a:lstStyle/>
+          <a:p>
+            <a:r>
+              <a:rPr lang="en-GB" sz="1600" dirty="0">
+                <a:latin typeface="Gill Sans MT" panose="020B0502020104020203" pitchFamily="34" charset="77"/>
+              </a:rPr>
+              <a:t>For other gradients and an excellent summary you can refer to the blog post by by Andrew Wood at: </a:t>
+            </a:r>
+          </a:p>
+          <a:p>
+            <a:endParaRPr lang="en-GB" sz="1600" dirty="0">
+              <a:latin typeface="Gill Sans MT" panose="020B0502020104020203" pitchFamily="34" charset="77"/>
+            </a:endParaRPr>
+          </a:p>
+          <a:p>
+            <a:r>
+              <a:rPr lang="en-GB" sz="1600" dirty="0">
+                <a:latin typeface="Gill Sans MT" panose="020B0502020104020203" pitchFamily="34" charset="77"/>
+              </a:rPr>
+              <a:t>https://aew61.github.io/blog/</a:t>
+            </a:r>
+            <a:r>
+              <a:rPr lang="en-GB" sz="1600" dirty="0" err="1">
+                <a:latin typeface="Gill Sans MT" panose="020B0502020104020203" pitchFamily="34" charset="77"/>
+              </a:rPr>
+              <a:t>artificial_neural_networks</a:t>
+            </a:r>
+            <a:r>
+              <a:rPr lang="en-GB" sz="1600" dirty="0">
+                <a:latin typeface="Gill Sans MT" panose="020B0502020104020203" pitchFamily="34" charset="77"/>
+              </a:rPr>
+              <a:t>/1_background/1.b_activation_functions_and_derivatives.html</a:t>
+            </a:r>
+          </a:p>
+        </p:txBody>
+      </p:sp>
+    </p:spTree>
+    <p:extLst>
+      <p:ext uri="{BB962C8B-B14F-4D97-AF65-F5344CB8AC3E}">
+        <p14:creationId xmlns:p14="http://schemas.microsoft.com/office/powerpoint/2010/main" val="1727762696"/>
       </p:ext>
     </p:extLst>
   </p:cSld>

</xml_diff>